<commit_message>
PPT Update with my Part
</commit_message>
<xml_diff>
--- a/doc/Task14/task14_presentation Schlurp.pptx
+++ b/doc/Task14/task14_presentation Schlurp.pptx
@@ -5,10 +5,10 @@
     <p:sldMasterId id="2147483669" r:id="rId4"/>
   </p:sldMasterIdLst>
   <p:notesMasterIdLst>
-    <p:notesMasterId r:id="rId22"/>
+    <p:notesMasterId r:id="rId23"/>
   </p:notesMasterIdLst>
   <p:handoutMasterIdLst>
-    <p:handoutMasterId r:id="rId23"/>
+    <p:handoutMasterId r:id="rId24"/>
   </p:handoutMasterIdLst>
   <p:sldIdLst>
     <p:sldId id="259" r:id="rId5"/>
@@ -19,15 +19,16 @@
     <p:sldId id="317" r:id="rId10"/>
     <p:sldId id="307" r:id="rId11"/>
     <p:sldId id="305" r:id="rId12"/>
-    <p:sldId id="306" r:id="rId13"/>
-    <p:sldId id="310" r:id="rId14"/>
-    <p:sldId id="311" r:id="rId15"/>
-    <p:sldId id="312" r:id="rId16"/>
-    <p:sldId id="313" r:id="rId17"/>
-    <p:sldId id="314" r:id="rId18"/>
-    <p:sldId id="315" r:id="rId19"/>
-    <p:sldId id="316" r:id="rId20"/>
-    <p:sldId id="299" r:id="rId21"/>
+    <p:sldId id="318" r:id="rId13"/>
+    <p:sldId id="306" r:id="rId14"/>
+    <p:sldId id="310" r:id="rId15"/>
+    <p:sldId id="311" r:id="rId16"/>
+    <p:sldId id="312" r:id="rId17"/>
+    <p:sldId id="313" r:id="rId18"/>
+    <p:sldId id="314" r:id="rId19"/>
+    <p:sldId id="315" r:id="rId20"/>
+    <p:sldId id="316" r:id="rId21"/>
+    <p:sldId id="299" r:id="rId22"/>
   </p:sldIdLst>
   <p:sldSz cx="9144000" cy="6858000" type="screen4x3"/>
   <p:notesSz cx="6669088" cy="9926638"/>
@@ -158,7 +159,7 @@
   </p:defaultTextStyle>
   <p:extLst>
     <p:ext uri="{EFAFB233-063F-42B5-8137-9DF3F51BA10A}">
-      <p15:sldGuideLst xmlns:p15="http://schemas.microsoft.com/office/powerpoint/2012/main">
+      <p15:sldGuideLst xmlns:p15="http://schemas.microsoft.com/office/powerpoint/2012/main" xmlns="">
         <p15:guide id="1" orient="horz" pos="2160">
           <p15:clr>
             <a:srgbClr val="A4A3A4"/>
@@ -172,7 +173,7 @@
       </p15:sldGuideLst>
     </p:ext>
     <p:ext uri="{2D200454-40CA-4A62-9FC3-DE9A4176ACB9}">
-      <p15:notesGuideLst xmlns:p15="http://schemas.microsoft.com/office/powerpoint/2012/main">
+      <p15:notesGuideLst xmlns:p15="http://schemas.microsoft.com/office/powerpoint/2012/main" xmlns="">
         <p15:guide id="1" orient="horz" pos="3127">
           <p15:clr>
             <a:srgbClr val="A4A3A4"/>
@@ -271,7 +272,7 @@
           <a:p>
             <a:fld id="{EFA0D184-D464-48E9-9CA0-A94E873F6C2C}" type="datetimeFigureOut">
               <a:rPr lang="de-CH" smtClean="0"/>
-              <a:t>tt.01.jjjj</a:t>
+              <a:t>20.01.2016</a:t>
             </a:fld>
             <a:endParaRPr lang="de-CH"/>
           </a:p>
@@ -436,7 +437,7 @@
           <a:p>
             <a:fld id="{5AF2B663-2BA9-4D7E-8201-5DE4109E1EDD}" type="datetimeFigureOut">
               <a:rPr lang="de-CH" smtClean="0"/>
-              <a:t>tt.01.jjjj</a:t>
+              <a:t>20.01.2016</a:t>
             </a:fld>
             <a:endParaRPr lang="de-CH"/>
           </a:p>
@@ -940,7 +941,6 @@
               <a:rPr lang="de-CH" baseline="0" dirty="0" smtClean="0"/>
               <a:t>Liste</a:t>
             </a:r>
-            <a:endParaRPr lang="de-CH" baseline="0" dirty="0" smtClean="0"/>
           </a:p>
           <a:p>
             <a:pPr marL="628650" lvl="1" indent="-171450">
@@ -949,11 +949,7 @@
             </a:pPr>
             <a:r>
               <a:rPr lang="de-CH" baseline="0" dirty="0" smtClean="0"/>
-              <a:t>State </a:t>
-            </a:r>
-            <a:r>
-              <a:rPr lang="de-CH" baseline="0" dirty="0" smtClean="0"/>
-              <a:t>wechseln, zurück</a:t>
+              <a:t>State wechseln, zurück</a:t>
             </a:r>
           </a:p>
           <a:p>
@@ -1143,7 +1139,7 @@
           <a:p>
             <a:fld id="{37E44704-8E6D-4CF2-8CFA-A0F7BC751896}" type="slidenum">
               <a:rPr lang="de-CH" smtClean="0"/>
-              <a:t>10</a:t>
+              <a:t>11</a:t>
             </a:fld>
             <a:endParaRPr lang="de-CH"/>
           </a:p>
@@ -1231,7 +1227,7 @@
           <a:p>
             <a:fld id="{37E44704-8E6D-4CF2-8CFA-A0F7BC751896}" type="slidenum">
               <a:rPr lang="de-CH" smtClean="0"/>
-              <a:t>11</a:t>
+              <a:t>12</a:t>
             </a:fld>
             <a:endParaRPr lang="de-CH"/>
           </a:p>
@@ -1319,7 +1315,7 @@
           <a:p>
             <a:fld id="{37E44704-8E6D-4CF2-8CFA-A0F7BC751896}" type="slidenum">
               <a:rPr lang="de-CH" smtClean="0"/>
-              <a:t>12</a:t>
+              <a:t>13</a:t>
             </a:fld>
             <a:endParaRPr lang="de-CH"/>
           </a:p>
@@ -1407,7 +1403,7 @@
           <a:p>
             <a:fld id="{37E44704-8E6D-4CF2-8CFA-A0F7BC751896}" type="slidenum">
               <a:rPr lang="de-CH" smtClean="0"/>
-              <a:t>13</a:t>
+              <a:t>14</a:t>
             </a:fld>
             <a:endParaRPr lang="de-CH"/>
           </a:p>
@@ -1495,7 +1491,7 @@
           <a:p>
             <a:fld id="{37E44704-8E6D-4CF2-8CFA-A0F7BC751896}" type="slidenum">
               <a:rPr lang="de-CH" smtClean="0"/>
-              <a:t>14</a:t>
+              <a:t>15</a:t>
             </a:fld>
             <a:endParaRPr lang="de-CH"/>
           </a:p>
@@ -1583,7 +1579,7 @@
           <a:p>
             <a:fld id="{37E44704-8E6D-4CF2-8CFA-A0F7BC751896}" type="slidenum">
               <a:rPr lang="de-CH" smtClean="0"/>
-              <a:t>15</a:t>
+              <a:t>16</a:t>
             </a:fld>
             <a:endParaRPr lang="de-CH"/>
           </a:p>
@@ -1671,7 +1667,7 @@
           <a:p>
             <a:fld id="{37E44704-8E6D-4CF2-8CFA-A0F7BC751896}" type="slidenum">
               <a:rPr lang="de-CH" smtClean="0"/>
-              <a:t>16</a:t>
+              <a:t>17</a:t>
             </a:fld>
             <a:endParaRPr lang="de-CH"/>
           </a:p>
@@ -1914,15 +1910,15 @@
             <a:noFill/>
           </a:ln>
           <a:extLst>
-            <a:ext uri="{909E8E84-426E-40dd-AFC4-6F175D3DCCD1}">
-              <a14:hiddenFill xmlns="" xmlns:a14="http://schemas.microsoft.com/office/drawing/2010/main">
+            <a:ext uri="{909E8E84-426E-40DD-AFC4-6F175D3DCCD1}">
+              <a14:hiddenFill xmlns:a14="http://schemas.microsoft.com/office/drawing/2010/main">
                 <a:solidFill>
                   <a:srgbClr val="FFFFFF"/>
                 </a:solidFill>
               </a14:hiddenFill>
             </a:ext>
-            <a:ext uri="{91240B29-F687-4f45-9708-019B960494DF}">
-              <a14:hiddenLine xmlns="" xmlns:a14="http://schemas.microsoft.com/office/drawing/2010/main" w="9525">
+            <a:ext uri="{91240B29-F687-4F45-9708-019B960494DF}">
+              <a14:hiddenLine xmlns:a14="http://schemas.microsoft.com/office/drawing/2010/main" w="9525">
                 <a:solidFill>
                   <a:srgbClr val="000000"/>
                 </a:solidFill>
@@ -3737,15 +3733,15 @@
             <a:noFill/>
           </a:ln>
           <a:extLst>
-            <a:ext uri="{909E8E84-426E-40dd-AFC4-6F175D3DCCD1}">
-              <a14:hiddenFill xmlns="" xmlns:a14="http://schemas.microsoft.com/office/drawing/2010/main">
+            <a:ext uri="{909E8E84-426E-40DD-AFC4-6F175D3DCCD1}">
+              <a14:hiddenFill xmlns:a14="http://schemas.microsoft.com/office/drawing/2010/main">
                 <a:solidFill>
                   <a:srgbClr val="FFFFFF"/>
                 </a:solidFill>
               </a14:hiddenFill>
             </a:ext>
-            <a:ext uri="{91240B29-F687-4f45-9708-019B960494DF}">
-              <a14:hiddenLine xmlns="" xmlns:a14="http://schemas.microsoft.com/office/drawing/2010/main" w="9525">
+            <a:ext uri="{91240B29-F687-4F45-9708-019B960494DF}">
+              <a14:hiddenLine xmlns:a14="http://schemas.microsoft.com/office/drawing/2010/main" w="9525">
                 <a:solidFill>
                   <a:srgbClr val="000000"/>
                 </a:solidFill>
@@ -7428,15 +7424,15 @@
             <a:noFill/>
           </a:ln>
           <a:extLst>
-            <a:ext uri="{909E8E84-426E-40dd-AFC4-6F175D3DCCD1}">
-              <a14:hiddenFill xmlns="" xmlns:a14="http://schemas.microsoft.com/office/drawing/2010/main">
+            <a:ext uri="{909E8E84-426E-40DD-AFC4-6F175D3DCCD1}">
+              <a14:hiddenFill xmlns:a14="http://schemas.microsoft.com/office/drawing/2010/main">
                 <a:solidFill>
                   <a:srgbClr val="FFFFFF"/>
                 </a:solidFill>
               </a14:hiddenFill>
             </a:ext>
-            <a:ext uri="{91240B29-F687-4f45-9708-019B960494DF}">
-              <a14:hiddenLine xmlns="" xmlns:a14="http://schemas.microsoft.com/office/drawing/2010/main" w="9525">
+            <a:ext uri="{91240B29-F687-4F45-9708-019B960494DF}">
+              <a14:hiddenLine xmlns:a14="http://schemas.microsoft.com/office/drawing/2010/main" w="9525">
                 <a:solidFill>
                   <a:srgbClr val="000000"/>
                 </a:solidFill>
@@ -8322,12 +8318,12 @@
       </p:grpSpPr>
       <p:sp>
         <p:nvSpPr>
-          <p:cNvPr id="6" name="Inhaltsplatzhalter 5"/>
+          <p:cNvPr id="3" name="Titel 2"/>
           <p:cNvSpPr>
             <a:spLocks noGrp="1"/>
           </p:cNvSpPr>
           <p:nvPr>
-            <p:ph sz="half" idx="1"/>
+            <p:ph type="ctrTitle"/>
           </p:nvPr>
         </p:nvSpPr>
         <p:spPr/>
@@ -8336,113 +8332,77 @@
           <a:lstStyle/>
           <a:p>
             <a:r>
-              <a:rPr lang="de-CH" dirty="0" smtClean="0"/>
-              <a:t>Schwierigkeiten</a:t>
-            </a:r>
-          </a:p>
-          <a:p>
-            <a:pPr lvl="1"/>
-            <a:r>
-              <a:rPr lang="de-CH" dirty="0" smtClean="0"/>
-              <a:t>Viele Unklarheiten Theorie-Praxis</a:t>
-            </a:r>
-          </a:p>
-          <a:p>
-            <a:pPr lvl="1"/>
-            <a:r>
-              <a:rPr lang="de-CH" dirty="0" smtClean="0"/>
-              <a:t>Fehlende Erfahrung</a:t>
-            </a:r>
-          </a:p>
-          <a:p>
-            <a:pPr lvl="1"/>
-            <a:r>
-              <a:rPr lang="de-CH" dirty="0" smtClean="0"/>
-              <a:t>Keine Vorstellung für Umsetzungsmöglichkeiten</a:t>
-            </a:r>
-          </a:p>
-          <a:p>
+              <a:rPr lang="de-DE" b="1" dirty="0" smtClean="0"/>
+              <a:t>Persönliche Beiträge</a:t>
+            </a:r>
             <a:endParaRPr lang="de-CH" dirty="0"/>
           </a:p>
-          <a:p>
-            <a:r>
-              <a:rPr lang="de-CH" dirty="0" err="1" smtClean="0"/>
-              <a:t>Lessons</a:t>
-            </a:r>
-            <a:r>
-              <a:rPr lang="de-CH" dirty="0" smtClean="0"/>
-              <a:t> </a:t>
-            </a:r>
-            <a:r>
-              <a:rPr lang="de-CH" dirty="0" err="1" smtClean="0"/>
-              <a:t>learned</a:t>
-            </a:r>
-            <a:endParaRPr lang="de-CH" dirty="0" smtClean="0"/>
-          </a:p>
-          <a:p>
-            <a:pPr lvl="1"/>
-            <a:r>
-              <a:rPr lang="de-CH" dirty="0" smtClean="0"/>
-              <a:t>Konsumentensicht</a:t>
-            </a:r>
-          </a:p>
-          <a:p>
-            <a:pPr lvl="1"/>
-            <a:r>
-              <a:rPr lang="de-CH" dirty="0" smtClean="0"/>
-              <a:t>Viele Ideen entwickeln</a:t>
-            </a:r>
-          </a:p>
-          <a:p>
-            <a:pPr lvl="1"/>
-            <a:r>
-              <a:rPr lang="de-CH" dirty="0" smtClean="0"/>
-              <a:t>Noch nicht an Umsetzung denken</a:t>
-            </a:r>
-          </a:p>
-        </p:txBody>
-      </p:sp>
-      <p:sp>
-        <p:nvSpPr>
-          <p:cNvPr id="5" name="Titel 4"/>
+        </p:txBody>
+      </p:sp>
+      <p:sp>
+        <p:nvSpPr>
+          <p:cNvPr id="5" name="Textplatzhalter 4"/>
           <p:cNvSpPr>
             <a:spLocks noGrp="1"/>
           </p:cNvSpPr>
           <p:nvPr>
-            <p:ph type="ctrTitle"/>
-          </p:nvPr>
-        </p:nvSpPr>
-        <p:spPr/>
+            <p:ph type="body" idx="1"/>
+          </p:nvPr>
+        </p:nvSpPr>
+        <p:spPr>
+          <a:xfrm>
+            <a:off x="468000" y="990000"/>
+            <a:ext cx="8100000" cy="540000"/>
+          </a:xfrm>
+        </p:spPr>
         <p:txBody>
           <a:bodyPr/>
           <a:lstStyle/>
           <a:p>
-            <a:pPr algn="ctr"/>
             <a:r>
               <a:rPr lang="de-CH" dirty="0" smtClean="0"/>
-              <a:t>Prozess </a:t>
-            </a:r>
-            <a:br>
-              <a:rPr lang="de-CH" dirty="0" smtClean="0"/>
-            </a:br>
-            <a:r>
-              <a:rPr lang="de-CH" sz="2000" dirty="0" smtClean="0"/>
-              <a:t>Storyboard</a:t>
-            </a:r>
-            <a:endParaRPr lang="de-CH" sz="2200" dirty="0"/>
+              <a:t>Mauro</a:t>
+            </a:r>
+            <a:endParaRPr lang="de-CH" dirty="0"/>
+          </a:p>
+        </p:txBody>
+      </p:sp>
+      <p:sp>
+        <p:nvSpPr>
+          <p:cNvPr id="6" name="Inhaltsplatzhalter 5"/>
+          <p:cNvSpPr>
+            <a:spLocks noGrp="1"/>
+          </p:cNvSpPr>
+          <p:nvPr>
+            <p:ph sz="half" idx="13"/>
+          </p:nvPr>
+        </p:nvSpPr>
+        <p:spPr/>
+        <p:txBody>
+          <a:bodyPr/>
+          <a:lstStyle/>
+          <a:p>
+            <a:endParaRPr lang="de-CH"/>
           </a:p>
         </p:txBody>
       </p:sp>
     </p:spTree>
     <p:extLst>
       <p:ext uri="{BB962C8B-B14F-4D97-AF65-F5344CB8AC3E}">
-        <p14:creationId xmlns:p14="http://schemas.microsoft.com/office/powerpoint/2010/main" val="352211297"/>
+        <p14:creationId xmlns:p14="http://schemas.microsoft.com/office/powerpoint/2010/main" val="371708231"/>
       </p:ext>
     </p:extLst>
   </p:cSld>
   <p:clrMapOvr>
     <a:masterClrMapping/>
   </p:clrMapOvr>
+  <p:timing>
+    <p:tnLst>
+      <p:par>
+        <p:cTn id="1" dur="indefinite" restart="never" nodeType="tmRoot"/>
+      </p:par>
+    </p:tnLst>
+  </p:timing>
 </p:sld>
 </file>
 
@@ -8487,7 +8447,7 @@
             <a:pPr lvl="1"/>
             <a:r>
               <a:rPr lang="de-CH" dirty="0" smtClean="0"/>
-              <a:t>Viele Einflussfaktoren</a:t>
+              <a:t>Viele Unklarheiten Theorie-Praxis</a:t>
             </a:r>
           </a:p>
           <a:p>
@@ -8496,11 +8456,16 @@
               <a:rPr lang="de-CH" dirty="0" smtClean="0"/>
               <a:t>Fehlende Erfahrung</a:t>
             </a:r>
+          </a:p>
+          <a:p>
+            <a:pPr lvl="1"/>
+            <a:r>
+              <a:rPr lang="de-CH" dirty="0" smtClean="0"/>
+              <a:t>Keine Vorstellung für Umsetzungsmöglichkeiten</a:t>
+            </a:r>
+          </a:p>
+          <a:p>
             <a:endParaRPr lang="de-CH" dirty="0"/>
-          </a:p>
-          <a:p>
-            <a:pPr lvl="1"/>
-            <a:endParaRPr lang="de-CH" dirty="0" smtClean="0"/>
           </a:p>
           <a:p>
             <a:r>
@@ -8521,40 +8486,22 @@
             <a:pPr lvl="1"/>
             <a:r>
               <a:rPr lang="de-CH" dirty="0" smtClean="0"/>
-              <a:t>Grundlage des Projekts</a:t>
+              <a:t>Konsumentensicht</a:t>
             </a:r>
           </a:p>
           <a:p>
             <a:pPr lvl="1"/>
             <a:r>
               <a:rPr lang="de-CH" dirty="0" smtClean="0"/>
-              <a:t>Alle Faktoren berücksichtigen</a:t>
-            </a:r>
-          </a:p>
-          <a:p>
-            <a:pPr lvl="2"/>
+              <a:t>Viele Ideen entwickeln</a:t>
+            </a:r>
+          </a:p>
+          <a:p>
+            <a:pPr lvl="1"/>
             <a:r>
               <a:rPr lang="de-CH" dirty="0" smtClean="0"/>
-              <a:t>Richtlinien</a:t>
-            </a:r>
-          </a:p>
-          <a:p>
-            <a:pPr lvl="2"/>
-            <a:r>
-              <a:rPr lang="de-CH" dirty="0" smtClean="0"/>
-              <a:t>Kundenanforderungen</a:t>
-            </a:r>
-          </a:p>
-          <a:p>
-            <a:pPr lvl="2"/>
-            <a:r>
-              <a:rPr lang="de-CH" dirty="0" smtClean="0"/>
-              <a:t>…</a:t>
-            </a:r>
-          </a:p>
-          <a:p>
-            <a:pPr lvl="1"/>
-            <a:endParaRPr lang="de-CH" dirty="0"/>
+              <a:t>Noch nicht an Umsetzung denken</a:t>
+            </a:r>
           </a:p>
         </p:txBody>
       </p:sp>
@@ -8582,8 +8529,8 @@
               <a:rPr lang="de-CH" dirty="0" smtClean="0"/>
             </a:br>
             <a:r>
-              <a:rPr lang="de-CH" sz="2000" dirty="0" err="1" smtClean="0"/>
-              <a:t>Requirements</a:t>
+              <a:rPr lang="de-CH" sz="2000" dirty="0" smtClean="0"/>
+              <a:t>Storyboard</a:t>
             </a:r>
             <a:endParaRPr lang="de-CH" sz="2200" dirty="0"/>
           </a:p>
@@ -8592,13 +8539,20 @@
     </p:spTree>
     <p:extLst>
       <p:ext uri="{BB962C8B-B14F-4D97-AF65-F5344CB8AC3E}">
-        <p14:creationId xmlns:p14="http://schemas.microsoft.com/office/powerpoint/2010/main" val="1331511723"/>
+        <p14:creationId xmlns:p14="http://schemas.microsoft.com/office/powerpoint/2010/main" val="352211297"/>
       </p:ext>
     </p:extLst>
   </p:cSld>
   <p:clrMapOvr>
     <a:masterClrMapping/>
   </p:clrMapOvr>
+  <p:timing>
+    <p:tnLst>
+      <p:par>
+        <p:cTn id="1" dur="indefinite" restart="never" nodeType="tmRoot"/>
+      </p:par>
+    </p:tnLst>
+  </p:timing>
 </p:sld>
 </file>
 
@@ -8643,36 +8597,19 @@
             <a:pPr lvl="1"/>
             <a:r>
               <a:rPr lang="de-CH" dirty="0" smtClean="0"/>
+              <a:t>Viele Einflussfaktoren</a:t>
+            </a:r>
+          </a:p>
+          <a:p>
+            <a:pPr lvl="1"/>
+            <a:r>
+              <a:rPr lang="de-CH" dirty="0" smtClean="0"/>
               <a:t>Fehlende Erfahrung</a:t>
             </a:r>
-          </a:p>
-          <a:p>
-            <a:pPr lvl="2"/>
-            <a:r>
-              <a:rPr lang="de-CH" dirty="0" smtClean="0"/>
-              <a:t>Wichtige Punkte vergessen</a:t>
-            </a:r>
+            <a:endParaRPr lang="de-CH" dirty="0"/>
           </a:p>
           <a:p>
             <a:pPr lvl="1"/>
-            <a:r>
-              <a:rPr lang="de-CH" dirty="0" smtClean="0"/>
-              <a:t>Überblick behalten</a:t>
-            </a:r>
-          </a:p>
-          <a:p>
-            <a:pPr lvl="1"/>
-            <a:r>
-              <a:rPr lang="de-CH" dirty="0" smtClean="0"/>
-              <a:t>Anbindung an </a:t>
-            </a:r>
-            <a:r>
-              <a:rPr lang="de-CH" dirty="0" err="1" smtClean="0"/>
-              <a:t>Vaadin</a:t>
-            </a:r>
-            <a:endParaRPr lang="de-CH" dirty="0"/>
-          </a:p>
-          <a:p>
             <a:endParaRPr lang="de-CH" dirty="0" smtClean="0"/>
           </a:p>
           <a:p>
@@ -8694,14 +8631,35 @@
             <a:pPr lvl="1"/>
             <a:r>
               <a:rPr lang="de-CH" dirty="0" smtClean="0"/>
-              <a:t>Ressourcen abklären</a:t>
+              <a:t>Grundlage des Projekts</a:t>
             </a:r>
           </a:p>
           <a:p>
             <a:pPr lvl="1"/>
             <a:r>
               <a:rPr lang="de-CH" dirty="0" smtClean="0"/>
-              <a:t>Externe Frameworks sind gut aber…</a:t>
+              <a:t>Alle Faktoren berücksichtigen</a:t>
+            </a:r>
+          </a:p>
+          <a:p>
+            <a:pPr lvl="2"/>
+            <a:r>
+              <a:rPr lang="de-CH" dirty="0" smtClean="0"/>
+              <a:t>Richtlinien</a:t>
+            </a:r>
+          </a:p>
+          <a:p>
+            <a:pPr lvl="2"/>
+            <a:r>
+              <a:rPr lang="de-CH" dirty="0" smtClean="0"/>
+              <a:t>Kundenanforderungen</a:t>
+            </a:r>
+          </a:p>
+          <a:p>
+            <a:pPr lvl="2"/>
+            <a:r>
+              <a:rPr lang="de-CH" dirty="0" smtClean="0"/>
+              <a:t>…</a:t>
             </a:r>
           </a:p>
           <a:p>
@@ -8734,8 +8692,8 @@
               <a:rPr lang="de-CH" dirty="0" smtClean="0"/>
             </a:br>
             <a:r>
-              <a:rPr lang="de-CH" sz="2000" dirty="0" smtClean="0"/>
-              <a:t>Design</a:t>
+              <a:rPr lang="de-CH" sz="2000" dirty="0" err="1" smtClean="0"/>
+              <a:t>Requirements</a:t>
             </a:r>
             <a:endParaRPr lang="de-CH" sz="2200" dirty="0"/>
           </a:p>
@@ -8744,7 +8702,7 @@
     </p:spTree>
     <p:extLst>
       <p:ext uri="{BB962C8B-B14F-4D97-AF65-F5344CB8AC3E}">
-        <p14:creationId xmlns:p14="http://schemas.microsoft.com/office/powerpoint/2010/main" val="1305885463"/>
+        <p14:creationId xmlns:p14="http://schemas.microsoft.com/office/powerpoint/2010/main" val="1331511723"/>
       </p:ext>
     </p:extLst>
   </p:cSld>
@@ -8795,28 +8753,32 @@
             <a:pPr lvl="1"/>
             <a:r>
               <a:rPr lang="de-CH" dirty="0" smtClean="0"/>
-              <a:t>Arbeitsaufteilung</a:t>
+              <a:t>Fehlende Erfahrung</a:t>
+            </a:r>
+          </a:p>
+          <a:p>
+            <a:pPr lvl="2"/>
+            <a:r>
+              <a:rPr lang="de-CH" dirty="0" smtClean="0"/>
+              <a:t>Wichtige Punkte vergessen</a:t>
             </a:r>
           </a:p>
           <a:p>
             <a:pPr lvl="1"/>
             <a:r>
               <a:rPr lang="de-CH" dirty="0" smtClean="0"/>
-              <a:t>Fehlende Erfahrung</a:t>
+              <a:t>Überblick behalten</a:t>
             </a:r>
           </a:p>
           <a:p>
             <a:pPr lvl="1"/>
             <a:r>
               <a:rPr lang="de-CH" dirty="0" smtClean="0"/>
-              <a:t>Aufwand schätzen</a:t>
-            </a:r>
-          </a:p>
-          <a:p>
-            <a:pPr lvl="1"/>
-            <a:r>
-              <a:rPr lang="de-CH" dirty="0" smtClean="0"/>
-              <a:t>Machbarkeit einschätzen</a:t>
+              <a:t>Anbindung an </a:t>
+            </a:r>
+            <a:r>
+              <a:rPr lang="de-CH" dirty="0" err="1" smtClean="0"/>
+              <a:t>Vaadin</a:t>
             </a:r>
             <a:endParaRPr lang="de-CH" dirty="0"/>
           </a:p>
@@ -8842,25 +8804,14 @@
             <a:pPr lvl="1"/>
             <a:r>
               <a:rPr lang="de-CH" dirty="0" smtClean="0"/>
-              <a:t>Umgang mit Ressourcen</a:t>
+              <a:t>Ressourcen abklären</a:t>
             </a:r>
           </a:p>
           <a:p>
             <a:pPr lvl="1"/>
             <a:r>
               <a:rPr lang="de-CH" dirty="0" smtClean="0"/>
-              <a:t>Teamarbeit</a:t>
-            </a:r>
-          </a:p>
-          <a:p>
-            <a:pPr lvl="1"/>
-            <a:r>
-              <a:rPr lang="de-CH" dirty="0" err="1" smtClean="0"/>
-              <a:t>Scrum</a:t>
-            </a:r>
-            <a:r>
-              <a:rPr lang="de-CH" dirty="0" smtClean="0"/>
-              <a:t>-Vorgehensweise</a:t>
+              <a:t>Externe Frameworks sind gut aber…</a:t>
             </a:r>
           </a:p>
           <a:p>
@@ -8894,7 +8845,7 @@
             </a:br>
             <a:r>
               <a:rPr lang="de-CH" sz="2000" dirty="0" smtClean="0"/>
-              <a:t>Implementation</a:t>
+              <a:t>Design</a:t>
             </a:r>
             <a:endParaRPr lang="de-CH" sz="2200" dirty="0"/>
           </a:p>
@@ -8903,7 +8854,7 @@
     </p:spTree>
     <p:extLst>
       <p:ext uri="{BB962C8B-B14F-4D97-AF65-F5344CB8AC3E}">
-        <p14:creationId xmlns:p14="http://schemas.microsoft.com/office/powerpoint/2010/main" val="2523521946"/>
+        <p14:creationId xmlns:p14="http://schemas.microsoft.com/office/powerpoint/2010/main" val="1305885463"/>
       </p:ext>
     </p:extLst>
   </p:cSld>
@@ -8932,12 +8883,12 @@
       </p:grpSpPr>
       <p:sp>
         <p:nvSpPr>
-          <p:cNvPr id="3" name="Titel 2"/>
+          <p:cNvPr id="6" name="Inhaltsplatzhalter 5"/>
           <p:cNvSpPr>
             <a:spLocks noGrp="1"/>
           </p:cNvSpPr>
           <p:nvPr>
-            <p:ph type="ctrTitle"/>
+            <p:ph sz="half" idx="1"/>
           </p:nvPr>
         </p:nvSpPr>
         <p:spPr/>
@@ -8946,96 +8897,123 @@
           <a:lstStyle/>
           <a:p>
             <a:r>
-              <a:rPr lang="de-DE" b="1" dirty="0" err="1" smtClean="0"/>
+              <a:rPr lang="de-CH" dirty="0" smtClean="0"/>
+              <a:t>Schwierigkeiten</a:t>
+            </a:r>
+          </a:p>
+          <a:p>
+            <a:pPr lvl="1"/>
+            <a:r>
+              <a:rPr lang="de-CH" dirty="0" smtClean="0"/>
+              <a:t>Arbeitsaufteilung</a:t>
+            </a:r>
+          </a:p>
+          <a:p>
+            <a:pPr lvl="1"/>
+            <a:r>
+              <a:rPr lang="de-CH" dirty="0" smtClean="0"/>
+              <a:t>Fehlende Erfahrung</a:t>
+            </a:r>
+          </a:p>
+          <a:p>
+            <a:pPr lvl="1"/>
+            <a:r>
+              <a:rPr lang="de-CH" dirty="0" smtClean="0"/>
+              <a:t>Aufwand schätzen</a:t>
+            </a:r>
+          </a:p>
+          <a:p>
+            <a:pPr lvl="1"/>
+            <a:r>
+              <a:rPr lang="de-CH" dirty="0" smtClean="0"/>
+              <a:t>Machbarkeit einschätzen</a:t>
+            </a:r>
+            <a:endParaRPr lang="de-CH" dirty="0"/>
+          </a:p>
+          <a:p>
+            <a:endParaRPr lang="de-CH" dirty="0" smtClean="0"/>
+          </a:p>
+          <a:p>
+            <a:r>
+              <a:rPr lang="de-CH" dirty="0" err="1" smtClean="0"/>
+              <a:t>Lessons</a:t>
+            </a:r>
+            <a:r>
+              <a:rPr lang="de-CH" dirty="0" smtClean="0"/>
+              <a:t> </a:t>
+            </a:r>
+            <a:r>
+              <a:rPr lang="de-CH" dirty="0" err="1" smtClean="0"/>
+              <a:t>learned</a:t>
+            </a:r>
+            <a:endParaRPr lang="de-CH" dirty="0" smtClean="0"/>
+          </a:p>
+          <a:p>
+            <a:pPr lvl="1"/>
+            <a:r>
+              <a:rPr lang="de-CH" dirty="0" smtClean="0"/>
+              <a:t>Umgang mit Ressourcen</a:t>
+            </a:r>
+          </a:p>
+          <a:p>
+            <a:pPr lvl="1"/>
+            <a:r>
+              <a:rPr lang="de-CH" dirty="0" smtClean="0"/>
+              <a:t>Teamarbeit</a:t>
+            </a:r>
+          </a:p>
+          <a:p>
+            <a:pPr lvl="1"/>
+            <a:r>
+              <a:rPr lang="de-CH" dirty="0" err="1" smtClean="0"/>
               <a:t>Scrum</a:t>
             </a:r>
             <a:r>
-              <a:rPr lang="de-DE" b="1" dirty="0" smtClean="0"/>
-              <a:t> Master</a:t>
-            </a:r>
+              <a:rPr lang="de-CH" dirty="0" smtClean="0"/>
+              <a:t>-Vorgehensweise</a:t>
+            </a:r>
+          </a:p>
+          <a:p>
+            <a:pPr lvl="1"/>
             <a:endParaRPr lang="de-CH" dirty="0"/>
           </a:p>
         </p:txBody>
       </p:sp>
       <p:sp>
         <p:nvSpPr>
-          <p:cNvPr id="6" name="Inhaltsplatzhalter 5"/>
+          <p:cNvPr id="5" name="Titel 4"/>
           <p:cNvSpPr>
             <a:spLocks noGrp="1"/>
           </p:cNvSpPr>
           <p:nvPr>
-            <p:ph sz="half" idx="13"/>
-          </p:nvPr>
-        </p:nvSpPr>
-        <p:spPr>
-          <a:xfrm>
-            <a:off x="468000" y="1099750"/>
-            <a:ext cx="8100000" cy="5020249"/>
-          </a:xfrm>
-        </p:spPr>
+            <p:ph type="ctrTitle"/>
+          </p:nvPr>
+        </p:nvSpPr>
+        <p:spPr/>
         <p:txBody>
           <a:bodyPr/>
           <a:lstStyle/>
           <a:p>
-            <a:r>
-              <a:rPr lang="de-CH" dirty="0" err="1" smtClean="0"/>
-              <a:t>Lessons</a:t>
-            </a:r>
+            <a:pPr algn="ctr"/>
             <a:r>
               <a:rPr lang="de-CH" dirty="0" smtClean="0"/>
-              <a:t> </a:t>
-            </a:r>
-            <a:r>
-              <a:rPr lang="de-CH" dirty="0" err="1" smtClean="0"/>
-              <a:t>learned</a:t>
-            </a:r>
-            <a:endParaRPr lang="de-CH" dirty="0" smtClean="0"/>
-          </a:p>
-          <a:p>
-            <a:pPr lvl="1"/>
-            <a:r>
+              <a:t>Prozess </a:t>
+            </a:r>
+            <a:br>
               <a:rPr lang="de-CH" dirty="0" smtClean="0"/>
-              <a:t>Unterschiedliche Fähigkeiten des Teams</a:t>
-            </a:r>
-          </a:p>
-          <a:p>
-            <a:pPr lvl="1"/>
-            <a:r>
-              <a:rPr lang="de-CH" dirty="0" smtClean="0"/>
-              <a:t>Zeitplanung</a:t>
-            </a:r>
-          </a:p>
-          <a:p>
-            <a:pPr lvl="1"/>
-            <a:r>
-              <a:rPr lang="de-CH" dirty="0" smtClean="0"/>
-              <a:t>Fehlende Erfahrung</a:t>
-            </a:r>
-          </a:p>
-          <a:p>
-            <a:pPr lvl="1"/>
-            <a:r>
-              <a:rPr lang="de-CH" dirty="0" smtClean="0"/>
-              <a:t>Prioritäten setzen</a:t>
-            </a:r>
-          </a:p>
-          <a:p>
-            <a:pPr lvl="1"/>
-            <a:r>
-              <a:rPr lang="de-CH" dirty="0" smtClean="0"/>
-              <a:t>Überblick behalten</a:t>
-            </a:r>
-          </a:p>
-          <a:p>
-            <a:pPr lvl="1"/>
-            <a:endParaRPr lang="de-CH" dirty="0" smtClean="0"/>
+            </a:br>
+            <a:r>
+              <a:rPr lang="de-CH" sz="2000" dirty="0" smtClean="0"/>
+              <a:t>Implementation</a:t>
+            </a:r>
+            <a:endParaRPr lang="de-CH" sz="2200" dirty="0"/>
           </a:p>
         </p:txBody>
       </p:sp>
     </p:spTree>
     <p:extLst>
       <p:ext uri="{BB962C8B-B14F-4D97-AF65-F5344CB8AC3E}">
-        <p14:creationId xmlns:p14="http://schemas.microsoft.com/office/powerpoint/2010/main" val="3305796004"/>
+        <p14:creationId xmlns:p14="http://schemas.microsoft.com/office/powerpoint/2010/main" val="2523521946"/>
       </p:ext>
     </p:extLst>
   </p:cSld>
@@ -9083,7 +9061,7 @@
             </a:r>
             <a:r>
               <a:rPr lang="de-DE" b="1" dirty="0" smtClean="0"/>
-              <a:t> Member</a:t>
+              <a:t> Master</a:t>
             </a:r>
             <a:endParaRPr lang="de-CH" dirty="0"/>
           </a:p>
@@ -9127,67 +9105,7 @@
             <a:pPr lvl="1"/>
             <a:r>
               <a:rPr lang="de-CH" dirty="0" smtClean="0"/>
-              <a:t>Daily </a:t>
-            </a:r>
-            <a:r>
-              <a:rPr lang="de-CH" dirty="0" err="1" smtClean="0"/>
-              <a:t>Scrum</a:t>
-            </a:r>
-            <a:r>
-              <a:rPr lang="de-CH" dirty="0" smtClean="0"/>
-              <a:t> wichtig für</a:t>
-            </a:r>
-          </a:p>
-          <a:p>
-            <a:pPr lvl="2"/>
-            <a:r>
-              <a:rPr lang="de-CH" dirty="0" smtClean="0"/>
-              <a:t>Arbeitsaufteilung</a:t>
-            </a:r>
-          </a:p>
-          <a:p>
-            <a:pPr lvl="2"/>
-            <a:r>
-              <a:rPr lang="de-CH" dirty="0" smtClean="0"/>
-              <a:t>Fortschritt</a:t>
-            </a:r>
-          </a:p>
-          <a:p>
-            <a:pPr lvl="2"/>
-            <a:r>
-              <a:rPr lang="de-CH" dirty="0" smtClean="0"/>
-              <a:t>Lösungssuche</a:t>
-            </a:r>
-          </a:p>
-          <a:p>
-            <a:pPr lvl="1"/>
-            <a:r>
-              <a:rPr lang="de-CH" dirty="0" smtClean="0"/>
-              <a:t>Dokumente </a:t>
-            </a:r>
-            <a:r>
-              <a:rPr lang="de-CH" dirty="0" err="1" smtClean="0"/>
-              <a:t>up</a:t>
-            </a:r>
-            <a:r>
-              <a:rPr lang="de-CH" dirty="0" smtClean="0"/>
-              <a:t> </a:t>
-            </a:r>
-            <a:r>
-              <a:rPr lang="de-CH" dirty="0" err="1" smtClean="0"/>
-              <a:t>to</a:t>
-            </a:r>
-            <a:r>
-              <a:rPr lang="de-CH" dirty="0" smtClean="0"/>
-              <a:t> </a:t>
-            </a:r>
-            <a:r>
-              <a:rPr lang="de-CH" dirty="0" err="1" smtClean="0"/>
-              <a:t>date</a:t>
-            </a:r>
-            <a:r>
-              <a:rPr lang="de-CH" dirty="0" smtClean="0"/>
-              <a:t> halten</a:t>
+              <a:t>Unterschiedliche Fähigkeiten des Teams</a:t>
             </a:r>
           </a:p>
           <a:p>
@@ -9199,14 +9117,35 @@
           </a:p>
           <a:p>
             <a:pPr lvl="1"/>
-            <a:endParaRPr lang="de-CH" dirty="0"/>
+            <a:r>
+              <a:rPr lang="de-CH" dirty="0" smtClean="0"/>
+              <a:t>Fehlende Erfahrung</a:t>
+            </a:r>
+          </a:p>
+          <a:p>
+            <a:pPr lvl="1"/>
+            <a:r>
+              <a:rPr lang="de-CH" dirty="0" smtClean="0"/>
+              <a:t>Prioritäten setzen</a:t>
+            </a:r>
+          </a:p>
+          <a:p>
+            <a:pPr lvl="1"/>
+            <a:r>
+              <a:rPr lang="de-CH" dirty="0" smtClean="0"/>
+              <a:t>Überblick behalten</a:t>
+            </a:r>
+          </a:p>
+          <a:p>
+            <a:pPr lvl="1"/>
+            <a:endParaRPr lang="de-CH" dirty="0" smtClean="0"/>
           </a:p>
         </p:txBody>
       </p:sp>
     </p:spTree>
     <p:extLst>
       <p:ext uri="{BB962C8B-B14F-4D97-AF65-F5344CB8AC3E}">
-        <p14:creationId xmlns:p14="http://schemas.microsoft.com/office/powerpoint/2010/main" val="611237871"/>
+        <p14:creationId xmlns:p14="http://schemas.microsoft.com/office/powerpoint/2010/main" val="3305796004"/>
       </p:ext>
     </p:extLst>
   </p:cSld>
@@ -9250,6 +9189,177 @@
           <a:p>
             <a:r>
               <a:rPr lang="de-DE" b="1" dirty="0" err="1" smtClean="0"/>
+              <a:t>Scrum</a:t>
+            </a:r>
+            <a:r>
+              <a:rPr lang="de-DE" b="1" dirty="0" smtClean="0"/>
+              <a:t> Member</a:t>
+            </a:r>
+            <a:endParaRPr lang="de-CH" dirty="0"/>
+          </a:p>
+        </p:txBody>
+      </p:sp>
+      <p:sp>
+        <p:nvSpPr>
+          <p:cNvPr id="6" name="Inhaltsplatzhalter 5"/>
+          <p:cNvSpPr>
+            <a:spLocks noGrp="1"/>
+          </p:cNvSpPr>
+          <p:nvPr>
+            <p:ph sz="half" idx="13"/>
+          </p:nvPr>
+        </p:nvSpPr>
+        <p:spPr>
+          <a:xfrm>
+            <a:off x="468000" y="1099750"/>
+            <a:ext cx="8100000" cy="5020249"/>
+          </a:xfrm>
+        </p:spPr>
+        <p:txBody>
+          <a:bodyPr/>
+          <a:lstStyle/>
+          <a:p>
+            <a:r>
+              <a:rPr lang="de-CH" dirty="0" err="1" smtClean="0"/>
+              <a:t>Lessons</a:t>
+            </a:r>
+            <a:r>
+              <a:rPr lang="de-CH" dirty="0" smtClean="0"/>
+              <a:t> </a:t>
+            </a:r>
+            <a:r>
+              <a:rPr lang="de-CH" dirty="0" err="1" smtClean="0"/>
+              <a:t>learned</a:t>
+            </a:r>
+            <a:endParaRPr lang="de-CH" dirty="0" smtClean="0"/>
+          </a:p>
+          <a:p>
+            <a:pPr lvl="1"/>
+            <a:r>
+              <a:rPr lang="de-CH" dirty="0" smtClean="0"/>
+              <a:t>Daily </a:t>
+            </a:r>
+            <a:r>
+              <a:rPr lang="de-CH" dirty="0" err="1" smtClean="0"/>
+              <a:t>Scrum</a:t>
+            </a:r>
+            <a:r>
+              <a:rPr lang="de-CH" dirty="0" smtClean="0"/>
+              <a:t> wichtig für</a:t>
+            </a:r>
+          </a:p>
+          <a:p>
+            <a:pPr lvl="2"/>
+            <a:r>
+              <a:rPr lang="de-CH" dirty="0" smtClean="0"/>
+              <a:t>Arbeitsaufteilung</a:t>
+            </a:r>
+          </a:p>
+          <a:p>
+            <a:pPr lvl="2"/>
+            <a:r>
+              <a:rPr lang="de-CH" dirty="0" smtClean="0"/>
+              <a:t>Fortschritt</a:t>
+            </a:r>
+          </a:p>
+          <a:p>
+            <a:pPr lvl="2"/>
+            <a:r>
+              <a:rPr lang="de-CH" dirty="0" smtClean="0"/>
+              <a:t>Lösungssuche</a:t>
+            </a:r>
+          </a:p>
+          <a:p>
+            <a:pPr lvl="1"/>
+            <a:r>
+              <a:rPr lang="de-CH" dirty="0" smtClean="0"/>
+              <a:t>Dokumente </a:t>
+            </a:r>
+            <a:r>
+              <a:rPr lang="de-CH" dirty="0" err="1" smtClean="0"/>
+              <a:t>up</a:t>
+            </a:r>
+            <a:r>
+              <a:rPr lang="de-CH" dirty="0" smtClean="0"/>
+              <a:t> </a:t>
+            </a:r>
+            <a:r>
+              <a:rPr lang="de-CH" dirty="0" err="1" smtClean="0"/>
+              <a:t>to</a:t>
+            </a:r>
+            <a:r>
+              <a:rPr lang="de-CH" dirty="0" smtClean="0"/>
+              <a:t> </a:t>
+            </a:r>
+            <a:r>
+              <a:rPr lang="de-CH" dirty="0" err="1" smtClean="0"/>
+              <a:t>date</a:t>
+            </a:r>
+            <a:r>
+              <a:rPr lang="de-CH" dirty="0" smtClean="0"/>
+              <a:t> halten</a:t>
+            </a:r>
+          </a:p>
+          <a:p>
+            <a:pPr lvl="1"/>
+            <a:r>
+              <a:rPr lang="de-CH" dirty="0" smtClean="0"/>
+              <a:t>Zeitplanung</a:t>
+            </a:r>
+          </a:p>
+          <a:p>
+            <a:pPr lvl="1"/>
+            <a:endParaRPr lang="de-CH" dirty="0"/>
+          </a:p>
+        </p:txBody>
+      </p:sp>
+    </p:spTree>
+    <p:extLst>
+      <p:ext uri="{BB962C8B-B14F-4D97-AF65-F5344CB8AC3E}">
+        <p14:creationId xmlns:p14="http://schemas.microsoft.com/office/powerpoint/2010/main" val="611237871"/>
+      </p:ext>
+    </p:extLst>
+  </p:cSld>
+  <p:clrMapOvr>
+    <a:masterClrMapping/>
+  </p:clrMapOvr>
+</p:sld>
+</file>
+
+<file path=ppt/slides/slide17.xml><?xml version="1.0" encoding="utf-8"?>
+<p:sld xmlns:a="http://schemas.openxmlformats.org/drawingml/2006/main" xmlns:r="http://schemas.openxmlformats.org/officeDocument/2006/relationships" xmlns:p="http://schemas.openxmlformats.org/presentationml/2006/main">
+  <p:cSld>
+    <p:spTree>
+      <p:nvGrpSpPr>
+        <p:cNvPr id="1" name=""/>
+        <p:cNvGrpSpPr/>
+        <p:nvPr/>
+      </p:nvGrpSpPr>
+      <p:grpSpPr>
+        <a:xfrm>
+          <a:off x="0" y="0"/>
+          <a:ext cx="0" cy="0"/>
+          <a:chOff x="0" y="0"/>
+          <a:chExt cx="0" cy="0"/>
+        </a:xfrm>
+      </p:grpSpPr>
+      <p:sp>
+        <p:nvSpPr>
+          <p:cNvPr id="3" name="Titel 2"/>
+          <p:cNvSpPr>
+            <a:spLocks noGrp="1"/>
+          </p:cNvSpPr>
+          <p:nvPr>
+            <p:ph type="ctrTitle"/>
+          </p:nvPr>
+        </p:nvSpPr>
+        <p:spPr/>
+        <p:txBody>
+          <a:bodyPr/>
+          <a:lstStyle/>
+          <a:p>
+            <a:r>
+              <a:rPr lang="de-DE" b="1" dirty="0" err="1" smtClean="0"/>
               <a:t>You</a:t>
             </a:r>
             <a:r>
@@ -9390,7 +9500,7 @@
 </p:sld>
 </file>
 
-<file path=ppt/slides/slide17.xml><?xml version="1.0" encoding="utf-8"?>
+<file path=ppt/slides/slide18.xml><?xml version="1.0" encoding="utf-8"?>
 <p:sld xmlns:a="http://schemas.openxmlformats.org/drawingml/2006/main" xmlns:r="http://schemas.openxmlformats.org/officeDocument/2006/relationships" xmlns:p="http://schemas.openxmlformats.org/presentationml/2006/main">
   <p:cSld>
     <p:spTree>
@@ -10067,11 +10177,7 @@
           <a:p>
             <a:r>
               <a:rPr lang="de-CH" dirty="0" smtClean="0"/>
-              <a:t>Random </a:t>
-            </a:r>
-            <a:r>
-              <a:rPr lang="de-CH" dirty="0" smtClean="0"/>
-              <a:t>GIF-Button</a:t>
+              <a:t>Random GIF-Button</a:t>
             </a:r>
             <a:endParaRPr lang="de-CH" dirty="0"/>
           </a:p>
@@ -10710,7 +10816,67 @@
           <a:bodyPr/>
           <a:lstStyle/>
           <a:p>
-            <a:endParaRPr lang="de-CH"/>
+            <a:r>
+              <a:rPr lang="de-CH" dirty="0"/>
+              <a:t>Elements </a:t>
+            </a:r>
+            <a:endParaRPr lang="de-CH" dirty="0" smtClean="0"/>
+          </a:p>
+          <a:p>
+            <a:pPr lvl="1"/>
+            <a:r>
+              <a:rPr lang="de-CH" dirty="0" smtClean="0"/>
+              <a:t>DrugTakeWrapper.java</a:t>
+            </a:r>
+          </a:p>
+          <a:p>
+            <a:pPr lvl="1"/>
+            <a:r>
+              <a:rPr lang="de-CH" dirty="0" smtClean="0"/>
+              <a:t>DrugWrapper.java</a:t>
+            </a:r>
+          </a:p>
+          <a:p>
+            <a:pPr lvl="1"/>
+            <a:r>
+              <a:rPr lang="de-CH" dirty="0" smtClean="0"/>
+              <a:t>Wrapper.java</a:t>
+            </a:r>
+          </a:p>
+          <a:p>
+            <a:r>
+              <a:rPr lang="de-CH" dirty="0" smtClean="0"/>
+              <a:t>Views</a:t>
+            </a:r>
+          </a:p>
+          <a:p>
+            <a:pPr lvl="1"/>
+            <a:r>
+              <a:rPr lang="de-CH" dirty="0" smtClean="0"/>
+              <a:t>HomeView.java</a:t>
+            </a:r>
+          </a:p>
+          <a:p>
+            <a:pPr lvl="1"/>
+            <a:r>
+              <a:rPr lang="de-CH" dirty="0" smtClean="0"/>
+              <a:t>InfoView.java</a:t>
+            </a:r>
+          </a:p>
+          <a:p>
+            <a:pPr lvl="1"/>
+            <a:r>
+              <a:rPr lang="de-CH" dirty="0" smtClean="0"/>
+              <a:t>MedicationsListView.java</a:t>
+            </a:r>
+          </a:p>
+          <a:p>
+            <a:pPr lvl="1"/>
+            <a:r>
+              <a:rPr lang="de-CH" dirty="0" smtClean="0"/>
+              <a:t>MedicationsView.java </a:t>
+            </a:r>
+            <a:endParaRPr lang="de-CH" dirty="0"/>
           </a:p>
         </p:txBody>
       </p:sp>
@@ -10724,6 +10890,13 @@
   <p:clrMapOvr>
     <a:masterClrMapping/>
   </p:clrMapOvr>
+  <p:timing>
+    <p:tnLst>
+      <p:par>
+        <p:cTn id="1" dur="indefinite" restart="never" nodeType="tmRoot"/>
+      </p:par>
+    </p:tnLst>
+  </p:timing>
 </p:sld>
 </file>
 
@@ -10789,41 +10962,657 @@
           <a:p>
             <a:r>
               <a:rPr lang="de-CH" dirty="0" smtClean="0"/>
-              <a:t>Mauro</a:t>
+              <a:t>Maurice - Wrapper</a:t>
             </a:r>
             <a:endParaRPr lang="de-CH" dirty="0"/>
           </a:p>
-        </p:txBody>
-      </p:sp>
-      <p:sp>
-        <p:nvSpPr>
-          <p:cNvPr id="6" name="Inhaltsplatzhalter 5"/>
-          <p:cNvSpPr>
-            <a:spLocks noGrp="1"/>
-          </p:cNvSpPr>
-          <p:nvPr>
-            <p:ph sz="half" idx="13"/>
-          </p:nvPr>
-        </p:nvSpPr>
-        <p:spPr/>
-        <p:txBody>
-          <a:bodyPr/>
+          <a:p>
+            <a:endParaRPr lang="de-CH" dirty="0"/>
+          </a:p>
+        </p:txBody>
+      </p:sp>
+      <p:pic>
+        <p:nvPicPr>
+          <p:cNvPr id="1026" name="Picture 2"/>
+          <p:cNvPicPr>
+            <a:picLocks noChangeAspect="1" noChangeArrowheads="1"/>
+          </p:cNvPicPr>
+          <p:nvPr/>
+        </p:nvPicPr>
+        <p:blipFill>
+          <a:blip r:embed="rId2">
+            <a:extLst>
+              <a:ext uri="{28A0092B-C50C-407E-A947-70E740481C1C}">
+                <a14:useLocalDpi xmlns:a14="http://schemas.microsoft.com/office/drawing/2010/main" val="0"/>
+              </a:ext>
+            </a:extLst>
+          </a:blip>
+          <a:srcRect/>
+          <a:stretch>
+            <a:fillRect/>
+          </a:stretch>
+        </p:blipFill>
+        <p:spPr bwMode="auto">
+          <a:xfrm>
+            <a:off x="997585" y="1530000"/>
+            <a:ext cx="2840715" cy="2275470"/>
+          </a:xfrm>
+          <a:prstGeom prst="rect">
+            <a:avLst/>
+          </a:prstGeom>
+          <a:noFill/>
+          <a:ln w="9525">
+            <a:solidFill>
+              <a:schemeClr val="tx1"/>
+            </a:solidFill>
+            <a:miter lim="800000"/>
+            <a:headEnd/>
+            <a:tailEnd/>
+          </a:ln>
+          <a:effectLst/>
+          <a:extLst>
+            <a:ext uri="{909E8E84-426E-40DD-AFC4-6F175D3DCCD1}">
+              <a14:hiddenFill xmlns:a14="http://schemas.microsoft.com/office/drawing/2010/main">
+                <a:solidFill>
+                  <a:schemeClr val="accent1"/>
+                </a:solidFill>
+              </a14:hiddenFill>
+            </a:ext>
+            <a:ext uri="{AF507438-7753-43E0-B8FC-AC1667EBCBE1}">
+              <a14:hiddenEffects xmlns:a14="http://schemas.microsoft.com/office/drawing/2010/main">
+                <a:effectLst>
+                  <a:outerShdw dist="35921" dir="2700000" algn="ctr" rotWithShape="0">
+                    <a:schemeClr val="bg2"/>
+                  </a:outerShdw>
+                </a:effectLst>
+              </a14:hiddenEffects>
+            </a:ext>
+          </a:extLst>
+        </p:spPr>
+      </p:pic>
+      <p:pic>
+        <p:nvPicPr>
+          <p:cNvPr id="1027" name="Picture 3"/>
+          <p:cNvPicPr>
+            <a:picLocks noChangeAspect="1" noChangeArrowheads="1"/>
+          </p:cNvPicPr>
+          <p:nvPr/>
+        </p:nvPicPr>
+        <p:blipFill>
+          <a:blip r:embed="rId3">
+            <a:extLst>
+              <a:ext uri="{28A0092B-C50C-407E-A947-70E740481C1C}">
+                <a14:useLocalDpi xmlns:a14="http://schemas.microsoft.com/office/drawing/2010/main" val="0"/>
+              </a:ext>
+            </a:extLst>
+          </a:blip>
+          <a:srcRect/>
+          <a:stretch>
+            <a:fillRect/>
+          </a:stretch>
+        </p:blipFill>
+        <p:spPr bwMode="auto">
+          <a:xfrm>
+            <a:off x="4543211" y="5149888"/>
+            <a:ext cx="1863086" cy="463806"/>
+          </a:xfrm>
+          <a:prstGeom prst="rect">
+            <a:avLst/>
+          </a:prstGeom>
+          <a:noFill/>
+          <a:ln w="9525">
+            <a:solidFill>
+              <a:schemeClr val="tx1"/>
+            </a:solidFill>
+            <a:miter lim="800000"/>
+            <a:headEnd/>
+            <a:tailEnd/>
+          </a:ln>
+          <a:effectLst/>
+          <a:extLst>
+            <a:ext uri="{909E8E84-426E-40DD-AFC4-6F175D3DCCD1}">
+              <a14:hiddenFill xmlns:a14="http://schemas.microsoft.com/office/drawing/2010/main">
+                <a:solidFill>
+                  <a:schemeClr val="accent1"/>
+                </a:solidFill>
+              </a14:hiddenFill>
+            </a:ext>
+            <a:ext uri="{AF507438-7753-43E0-B8FC-AC1667EBCBE1}">
+              <a14:hiddenEffects xmlns:a14="http://schemas.microsoft.com/office/drawing/2010/main">
+                <a:effectLst>
+                  <a:outerShdw dist="35921" dir="2700000" algn="ctr" rotWithShape="0">
+                    <a:schemeClr val="bg2"/>
+                  </a:outerShdw>
+                </a:effectLst>
+              </a14:hiddenEffects>
+            </a:ext>
+          </a:extLst>
+        </p:spPr>
+      </p:pic>
+      <p:pic>
+        <p:nvPicPr>
+          <p:cNvPr id="1028" name="Picture 4"/>
+          <p:cNvPicPr>
+            <a:picLocks noChangeAspect="1" noChangeArrowheads="1"/>
+          </p:cNvPicPr>
+          <p:nvPr/>
+        </p:nvPicPr>
+        <p:blipFill>
+          <a:blip r:embed="rId4">
+            <a:extLst>
+              <a:ext uri="{28A0092B-C50C-407E-A947-70E740481C1C}">
+                <a14:useLocalDpi xmlns:a14="http://schemas.microsoft.com/office/drawing/2010/main" val="0"/>
+              </a:ext>
+            </a:extLst>
+          </a:blip>
+          <a:srcRect/>
+          <a:stretch>
+            <a:fillRect/>
+          </a:stretch>
+        </p:blipFill>
+        <p:spPr bwMode="auto">
+          <a:xfrm>
+            <a:off x="1113794" y="4526200"/>
+            <a:ext cx="2608298" cy="605642"/>
+          </a:xfrm>
+          <a:prstGeom prst="rect">
+            <a:avLst/>
+          </a:prstGeom>
+          <a:noFill/>
+          <a:ln w="9525">
+            <a:solidFill>
+              <a:schemeClr val="tx1"/>
+            </a:solidFill>
+            <a:miter lim="800000"/>
+            <a:headEnd/>
+            <a:tailEnd/>
+          </a:ln>
+          <a:effectLst/>
+          <a:extLst>
+            <a:ext uri="{909E8E84-426E-40DD-AFC4-6F175D3DCCD1}">
+              <a14:hiddenFill xmlns:a14="http://schemas.microsoft.com/office/drawing/2010/main">
+                <a:solidFill>
+                  <a:schemeClr val="accent1"/>
+                </a:solidFill>
+              </a14:hiddenFill>
+            </a:ext>
+            <a:ext uri="{AF507438-7753-43E0-B8FC-AC1667EBCBE1}">
+              <a14:hiddenEffects xmlns:a14="http://schemas.microsoft.com/office/drawing/2010/main">
+                <a:effectLst>
+                  <a:outerShdw dist="35921" dir="2700000" algn="ctr" rotWithShape="0">
+                    <a:schemeClr val="bg2"/>
+                  </a:outerShdw>
+                </a:effectLst>
+              </a14:hiddenEffects>
+            </a:ext>
+          </a:extLst>
+        </p:spPr>
+      </p:pic>
+      <p:pic>
+        <p:nvPicPr>
+          <p:cNvPr id="1029" name="Picture 5"/>
+          <p:cNvPicPr>
+            <a:picLocks noChangeAspect="1" noChangeArrowheads="1"/>
+          </p:cNvPicPr>
+          <p:nvPr/>
+        </p:nvPicPr>
+        <p:blipFill>
+          <a:blip r:embed="rId5">
+            <a:extLst>
+              <a:ext uri="{28A0092B-C50C-407E-A947-70E740481C1C}">
+                <a14:useLocalDpi xmlns:a14="http://schemas.microsoft.com/office/drawing/2010/main" val="0"/>
+              </a:ext>
+            </a:extLst>
+          </a:blip>
+          <a:srcRect/>
+          <a:stretch>
+            <a:fillRect/>
+          </a:stretch>
+        </p:blipFill>
+        <p:spPr bwMode="auto">
+          <a:xfrm>
+            <a:off x="5594005" y="1079626"/>
+            <a:ext cx="2516137" cy="900747"/>
+          </a:xfrm>
+          <a:prstGeom prst="rect">
+            <a:avLst/>
+          </a:prstGeom>
+          <a:noFill/>
+          <a:ln w="9525">
+            <a:solidFill>
+              <a:schemeClr val="tx1"/>
+            </a:solidFill>
+            <a:miter lim="800000"/>
+            <a:headEnd/>
+            <a:tailEnd/>
+          </a:ln>
+          <a:effectLst/>
+          <a:extLst>
+            <a:ext uri="{909E8E84-426E-40DD-AFC4-6F175D3DCCD1}">
+              <a14:hiddenFill xmlns:a14="http://schemas.microsoft.com/office/drawing/2010/main">
+                <a:solidFill>
+                  <a:schemeClr val="accent1"/>
+                </a:solidFill>
+              </a14:hiddenFill>
+            </a:ext>
+            <a:ext uri="{AF507438-7753-43E0-B8FC-AC1667EBCBE1}">
+              <a14:hiddenEffects xmlns:a14="http://schemas.microsoft.com/office/drawing/2010/main">
+                <a:effectLst>
+                  <a:outerShdw dist="35921" dir="2700000" algn="ctr" rotWithShape="0">
+                    <a:schemeClr val="bg2"/>
+                  </a:outerShdw>
+                </a:effectLst>
+              </a14:hiddenEffects>
+            </a:ext>
+          </a:extLst>
+        </p:spPr>
+      </p:pic>
+      <p:cxnSp>
+        <p:nvCxnSpPr>
+          <p:cNvPr id="20" name="Gerade Verbindung mit Pfeil 19"/>
+          <p:cNvCxnSpPr>
+            <a:stCxn id="1030" idx="3"/>
+            <a:endCxn id="1027" idx="1"/>
+          </p:cNvCxnSpPr>
+          <p:nvPr/>
+        </p:nvCxnSpPr>
+        <p:spPr>
+          <a:xfrm flipV="1">
+            <a:off x="3399010" y="5381791"/>
+            <a:ext cx="1144201" cy="547048"/>
+          </a:xfrm>
+          <a:prstGeom prst="straightConnector1">
+            <a:avLst/>
+          </a:prstGeom>
+          <a:ln>
+            <a:tailEnd type="stealth" w="lg" len="lg"/>
+          </a:ln>
+        </p:spPr>
+        <p:style>
+          <a:lnRef idx="2">
+            <a:schemeClr val="accent1"/>
+          </a:lnRef>
+          <a:fillRef idx="0">
+            <a:schemeClr val="accent1"/>
+          </a:fillRef>
+          <a:effectRef idx="1">
+            <a:schemeClr val="accent1"/>
+          </a:effectRef>
+          <a:fontRef idx="minor">
+            <a:schemeClr val="tx1"/>
+          </a:fontRef>
+        </p:style>
+      </p:cxnSp>
+      <p:cxnSp>
+        <p:nvCxnSpPr>
+          <p:cNvPr id="21" name="Gerade Verbindung mit Pfeil 20"/>
+          <p:cNvCxnSpPr>
+            <a:stCxn id="1026" idx="2"/>
+            <a:endCxn id="1028" idx="0"/>
+          </p:cNvCxnSpPr>
+          <p:nvPr/>
+        </p:nvCxnSpPr>
+        <p:spPr>
+          <a:xfrm>
+            <a:off x="2417943" y="3805470"/>
+            <a:ext cx="0" cy="720730"/>
+          </a:xfrm>
+          <a:prstGeom prst="straightConnector1">
+            <a:avLst/>
+          </a:prstGeom>
+          <a:ln>
+            <a:tailEnd type="stealth" w="lg" len="lg"/>
+          </a:ln>
+        </p:spPr>
+        <p:style>
+          <a:lnRef idx="2">
+            <a:schemeClr val="accent1"/>
+          </a:lnRef>
+          <a:fillRef idx="0">
+            <a:schemeClr val="accent1"/>
+          </a:fillRef>
+          <a:effectRef idx="1">
+            <a:schemeClr val="accent1"/>
+          </a:effectRef>
+          <a:fontRef idx="minor">
+            <a:schemeClr val="tx1"/>
+          </a:fontRef>
+        </p:style>
+      </p:cxnSp>
+      <p:cxnSp>
+        <p:nvCxnSpPr>
+          <p:cNvPr id="22" name="Gerade Verbindung mit Pfeil 21"/>
+          <p:cNvCxnSpPr>
+            <a:endCxn id="1029" idx="1"/>
+          </p:cNvCxnSpPr>
+          <p:nvPr/>
+        </p:nvCxnSpPr>
+        <p:spPr>
+          <a:xfrm>
+            <a:off x="3838300" y="1530000"/>
+            <a:ext cx="1755705" cy="0"/>
+          </a:xfrm>
+          <a:prstGeom prst="straightConnector1">
+            <a:avLst/>
+          </a:prstGeom>
+          <a:ln>
+            <a:tailEnd type="stealth" w="lg" len="lg"/>
+          </a:ln>
+        </p:spPr>
+        <p:style>
+          <a:lnRef idx="2">
+            <a:schemeClr val="accent1"/>
+          </a:lnRef>
+          <a:fillRef idx="0">
+            <a:schemeClr val="accent1"/>
+          </a:fillRef>
+          <a:effectRef idx="1">
+            <a:schemeClr val="accent1"/>
+          </a:effectRef>
+          <a:fontRef idx="minor">
+            <a:schemeClr val="tx1"/>
+          </a:fontRef>
+        </p:style>
+      </p:cxnSp>
+      <p:pic>
+        <p:nvPicPr>
+          <p:cNvPr id="1030" name="Picture 6"/>
+          <p:cNvPicPr>
+            <a:picLocks noChangeAspect="1" noChangeArrowheads="1"/>
+          </p:cNvPicPr>
+          <p:nvPr/>
+        </p:nvPicPr>
+        <p:blipFill>
+          <a:blip r:embed="rId6">
+            <a:extLst>
+              <a:ext uri="{28A0092B-C50C-407E-A947-70E740481C1C}">
+                <a14:useLocalDpi xmlns:a14="http://schemas.microsoft.com/office/drawing/2010/main" val="0"/>
+              </a:ext>
+            </a:extLst>
+          </a:blip>
+          <a:srcRect/>
+          <a:stretch>
+            <a:fillRect/>
+          </a:stretch>
+        </p:blipFill>
+        <p:spPr bwMode="auto">
+          <a:xfrm>
+            <a:off x="1436876" y="5637584"/>
+            <a:ext cx="1962134" cy="582509"/>
+          </a:xfrm>
+          <a:prstGeom prst="rect">
+            <a:avLst/>
+          </a:prstGeom>
+          <a:noFill/>
+          <a:ln w="9525">
+            <a:solidFill>
+              <a:schemeClr val="tx1"/>
+            </a:solidFill>
+            <a:miter lim="800000"/>
+            <a:headEnd/>
+            <a:tailEnd/>
+          </a:ln>
+          <a:effectLst/>
+          <a:extLst>
+            <a:ext uri="{909E8E84-426E-40DD-AFC4-6F175D3DCCD1}">
+              <a14:hiddenFill xmlns:a14="http://schemas.microsoft.com/office/drawing/2010/main">
+                <a:solidFill>
+                  <a:schemeClr val="accent1"/>
+                </a:solidFill>
+              </a14:hiddenFill>
+            </a:ext>
+            <a:ext uri="{AF507438-7753-43E0-B8FC-AC1667EBCBE1}">
+              <a14:hiddenEffects xmlns:a14="http://schemas.microsoft.com/office/drawing/2010/main">
+                <a:effectLst>
+                  <a:outerShdw dist="35921" dir="2700000" algn="ctr" rotWithShape="0">
+                    <a:schemeClr val="bg2"/>
+                  </a:outerShdw>
+                </a:effectLst>
+              </a14:hiddenEffects>
+            </a:ext>
+          </a:extLst>
+        </p:spPr>
+      </p:pic>
+      <p:sp>
+        <p:nvSpPr>
+          <p:cNvPr id="58" name="Textfeld 57"/>
+          <p:cNvSpPr txBox="1"/>
+          <p:nvPr/>
+        </p:nvSpPr>
+        <p:spPr>
+          <a:xfrm>
+            <a:off x="2417943" y="3862781"/>
+            <a:ext cx="1880316" cy="307777"/>
+          </a:xfrm>
+          <a:prstGeom prst="rect">
+            <a:avLst/>
+          </a:prstGeom>
+          <a:noFill/>
+        </p:spPr>
+        <p:txBody>
+          <a:bodyPr wrap="square" rtlCol="0">
+            <a:spAutoFit/>
+          </a:bodyPr>
           <a:lstStyle/>
           <a:p>
+            <a:r>
+              <a:rPr lang="de-CH" sz="1400" dirty="0" smtClean="0"/>
+              <a:t>Feste Bestandteile</a:t>
+            </a:r>
+            <a:endParaRPr lang="de-CH" sz="1400" dirty="0"/>
+          </a:p>
+        </p:txBody>
+      </p:sp>
+      <p:sp>
+        <p:nvSpPr>
+          <p:cNvPr id="66" name="Textfeld 65"/>
+          <p:cNvSpPr txBox="1"/>
+          <p:nvPr/>
+        </p:nvSpPr>
+        <p:spPr>
+          <a:xfrm>
+            <a:off x="4244850" y="1229057"/>
+            <a:ext cx="826395" cy="307777"/>
+          </a:xfrm>
+          <a:prstGeom prst="rect">
+            <a:avLst/>
+          </a:prstGeom>
+          <a:noFill/>
+        </p:spPr>
+        <p:txBody>
+          <a:bodyPr wrap="square" rtlCol="0">
+            <a:spAutoFit/>
+          </a:bodyPr>
+          <a:lstStyle/>
+          <a:p>
+            <a:r>
+              <a:rPr lang="de-CH" sz="1400" dirty="0" smtClean="0"/>
+              <a:t>Optional</a:t>
+            </a:r>
+            <a:endParaRPr lang="de-CH" sz="1400" dirty="0"/>
+          </a:p>
+        </p:txBody>
+      </p:sp>
+      <p:sp>
+        <p:nvSpPr>
+          <p:cNvPr id="60" name="Plus 59"/>
+          <p:cNvSpPr/>
+          <p:nvPr/>
+        </p:nvSpPr>
+        <p:spPr>
+          <a:xfrm>
+            <a:off x="2263396" y="5208232"/>
+            <a:ext cx="309093" cy="339584"/>
+          </a:xfrm>
+          <a:prstGeom prst="mathPlus">
+            <a:avLst/>
+          </a:prstGeom>
+        </p:spPr>
+        <p:style>
+          <a:lnRef idx="1">
+            <a:schemeClr val="accent1"/>
+          </a:lnRef>
+          <a:fillRef idx="3">
+            <a:schemeClr val="accent1"/>
+          </a:fillRef>
+          <a:effectRef idx="2">
+            <a:schemeClr val="accent1"/>
+          </a:effectRef>
+          <a:fontRef idx="minor">
+            <a:schemeClr val="lt1"/>
+          </a:fontRef>
+        </p:style>
+        <p:txBody>
+          <a:bodyPr rtlCol="0" anchor="ctr"/>
+          <a:lstStyle/>
+          <a:p>
+            <a:pPr algn="ctr"/>
             <a:endParaRPr lang="de-CH"/>
           </a:p>
         </p:txBody>
       </p:sp>
+      <p:cxnSp>
+        <p:nvCxnSpPr>
+          <p:cNvPr id="70" name="Gerade Verbindung mit Pfeil 69"/>
+          <p:cNvCxnSpPr>
+            <a:stCxn id="1028" idx="3"/>
+            <a:endCxn id="1027" idx="1"/>
+          </p:cNvCxnSpPr>
+          <p:nvPr/>
+        </p:nvCxnSpPr>
+        <p:spPr>
+          <a:xfrm>
+            <a:off x="3722092" y="4829021"/>
+            <a:ext cx="821119" cy="552770"/>
+          </a:xfrm>
+          <a:prstGeom prst="straightConnector1">
+            <a:avLst/>
+          </a:prstGeom>
+          <a:ln>
+            <a:tailEnd type="stealth" w="lg" len="lg"/>
+          </a:ln>
+        </p:spPr>
+        <p:style>
+          <a:lnRef idx="2">
+            <a:schemeClr val="accent1"/>
+          </a:lnRef>
+          <a:fillRef idx="0">
+            <a:schemeClr val="accent1"/>
+          </a:fillRef>
+          <a:effectRef idx="1">
+            <a:schemeClr val="accent1"/>
+          </a:effectRef>
+          <a:fontRef idx="minor">
+            <a:schemeClr val="tx1"/>
+          </a:fontRef>
+        </p:style>
+      </p:cxnSp>
+      <p:sp>
+        <p:nvSpPr>
+          <p:cNvPr id="75" name="Textfeld 74"/>
+          <p:cNvSpPr txBox="1"/>
+          <p:nvPr/>
+        </p:nvSpPr>
+        <p:spPr>
+          <a:xfrm>
+            <a:off x="7077599" y="2359958"/>
+            <a:ext cx="1490401" cy="307777"/>
+          </a:xfrm>
+          <a:prstGeom prst="rect">
+            <a:avLst/>
+          </a:prstGeom>
+          <a:noFill/>
+        </p:spPr>
+        <p:txBody>
+          <a:bodyPr wrap="square" rtlCol="0">
+            <a:spAutoFit/>
+          </a:bodyPr>
+          <a:lstStyle/>
+          <a:p>
+            <a:r>
+              <a:rPr lang="de-CH" sz="1400" dirty="0" smtClean="0"/>
+              <a:t>Definiert durch</a:t>
+            </a:r>
+            <a:endParaRPr lang="de-CH" sz="1400" dirty="0"/>
+          </a:p>
+        </p:txBody>
+      </p:sp>
+      <p:pic>
+        <p:nvPicPr>
+          <p:cNvPr id="1032" name="Picture 8"/>
+          <p:cNvPicPr>
+            <a:picLocks noChangeAspect="1" noChangeArrowheads="1"/>
+          </p:cNvPicPr>
+          <p:nvPr/>
+        </p:nvPicPr>
+        <p:blipFill>
+          <a:blip r:embed="rId7">
+            <a:extLst>
+              <a:ext uri="{28A0092B-C50C-407E-A947-70E740481C1C}">
+                <a14:useLocalDpi xmlns:a14="http://schemas.microsoft.com/office/drawing/2010/main" val="0"/>
+              </a:ext>
+            </a:extLst>
+          </a:blip>
+          <a:srcRect/>
+          <a:stretch>
+            <a:fillRect/>
+          </a:stretch>
+        </p:blipFill>
+        <p:spPr bwMode="auto">
+          <a:xfrm>
+            <a:off x="7022370" y="2667735"/>
+            <a:ext cx="1545630" cy="3300493"/>
+          </a:xfrm>
+          <a:prstGeom prst="rect">
+            <a:avLst/>
+          </a:prstGeom>
+          <a:noFill/>
+          <a:ln w="9525">
+            <a:solidFill>
+              <a:schemeClr val="tx1"/>
+            </a:solidFill>
+            <a:miter lim="800000"/>
+            <a:headEnd/>
+            <a:tailEnd/>
+          </a:ln>
+          <a:effectLst/>
+          <a:extLst>
+            <a:ext uri="{909E8E84-426E-40DD-AFC4-6F175D3DCCD1}">
+              <a14:hiddenFill xmlns:a14="http://schemas.microsoft.com/office/drawing/2010/main">
+                <a:solidFill>
+                  <a:schemeClr val="accent1"/>
+                </a:solidFill>
+              </a14:hiddenFill>
+            </a:ext>
+            <a:ext uri="{AF507438-7753-43E0-B8FC-AC1667EBCBE1}">
+              <a14:hiddenEffects xmlns:a14="http://schemas.microsoft.com/office/drawing/2010/main">
+                <a:effectLst>
+                  <a:outerShdw dist="35921" dir="2700000" algn="ctr" rotWithShape="0">
+                    <a:schemeClr val="bg2"/>
+                  </a:outerShdw>
+                </a:effectLst>
+              </a14:hiddenEffects>
+            </a:ext>
+          </a:extLst>
+        </p:spPr>
+      </p:pic>
     </p:spTree>
     <p:extLst>
       <p:ext uri="{BB962C8B-B14F-4D97-AF65-F5344CB8AC3E}">
-        <p14:creationId xmlns:p14="http://schemas.microsoft.com/office/powerpoint/2010/main" val="371708231"/>
+        <p14:creationId xmlns:p14="http://schemas.microsoft.com/office/powerpoint/2010/main" val="613959045"/>
       </p:ext>
     </p:extLst>
   </p:cSld>
   <p:clrMapOvr>
     <a:masterClrMapping/>
   </p:clrMapOvr>
+  <p:timing>
+    <p:tnLst>
+      <p:par>
+        <p:cTn id="1" dur="indefinite" restart="never" nodeType="tmRoot"/>
+      </p:par>
+    </p:tnLst>
+  </p:timing>
 </p:sld>
 </file>
 
@@ -11658,23 +12447,6 @@
 </file>
 
 <file path=customXml/item1.xml><?xml version="1.0" encoding="utf-8"?>
-<p:properties xmlns:p="http://schemas.microsoft.com/office/2006/metadata/properties" xmlns:xsi="http://www.w3.org/2001/XMLSchema-instance">
-  <documentManagement>
-    <AVMTitle xmlns="5091c847-84be-4f4f-b16c-c018ad2ca66b">Präsentation BFH_2013</AVMTitle>
-  </documentManagement>
-</p:properties>
-</file>
-
-<file path=customXml/item2.xml><?xml version="1.0" encoding="utf-8"?>
-<?mso-contentType ?>
-<FormTemplates xmlns="http://schemas.microsoft.com/sharepoint/v3/contenttype/forms">
-  <Display>DocumentLibraryForm</Display>
-  <Edit>DocumentLibraryForm</Edit>
-  <New>DocumentLibraryForm</New>
-</FormTemplates>
-</file>
-
-<file path=customXml/item3.xml><?xml version="1.0" encoding="utf-8"?>
 <ct:contentTypeSchema xmlns:ct="http://schemas.microsoft.com/office/2006/metadata/contentType" xmlns:ma="http://schemas.microsoft.com/office/2006/metadata/properties/metaAttributes" ct:_="" ma:_="" ma:contentTypeName="Dokument" ma:contentTypeID="0x010100EBE3A9EFF36793468C03E2811ACE2A2B" ma:contentTypeVersion="1" ma:contentTypeDescription="Ein neues Dokument erstellen." ma:contentTypeScope="" ma:versionID="e65be32cb1bfff77fc8c9c09bf542651">
   <xsd:schema xmlns:xsd="http://www.w3.org/2001/XMLSchema" xmlns:p="http://schemas.microsoft.com/office/2006/metadata/properties" xmlns:ns2="5091c847-84be-4f4f-b16c-c018ad2ca66b" targetNamespace="http://schemas.microsoft.com/office/2006/metadata/properties" ma:root="true" ma:fieldsID="7636c84aed5b7d09a166fcef888725d4" ns2:_="">
     <xsd:import namespace="5091c847-84be-4f4f-b16c-c018ad2ca66b"/>
@@ -11734,30 +12506,24 @@
 </ct:contentTypeSchema>
 </file>
 
-<file path=customXml/itemProps1.xml><?xml version="1.0" encoding="utf-8"?>
-<ds:datastoreItem xmlns:ds="http://schemas.openxmlformats.org/officeDocument/2006/customXml" ds:itemID="{32991507-CB83-4F49-BAFB-D322B1D04098}">
-  <ds:schemaRefs>
-    <ds:schemaRef ds:uri="http://purl.org/dc/terms/"/>
-    <ds:schemaRef ds:uri="http://purl.org/dc/elements/1.1/"/>
-    <ds:schemaRef ds:uri="http://www.w3.org/XML/1998/namespace"/>
-    <ds:schemaRef ds:uri="http://schemas.microsoft.com/office/2006/documentManagement/types"/>
-    <ds:schemaRef ds:uri="http://schemas.openxmlformats.org/package/2006/metadata/core-properties"/>
-    <ds:schemaRef ds:uri="5091c847-84be-4f4f-b16c-c018ad2ca66b"/>
-    <ds:schemaRef ds:uri="http://schemas.microsoft.com/office/2006/metadata/properties"/>
-    <ds:schemaRef ds:uri="http://purl.org/dc/dcmitype/"/>
-  </ds:schemaRefs>
-</ds:datastoreItem>
+<file path=customXml/item2.xml><?xml version="1.0" encoding="utf-8"?>
+<?mso-contentType ?>
+<FormTemplates xmlns="http://schemas.microsoft.com/sharepoint/v3/contenttype/forms">
+  <Display>DocumentLibraryForm</Display>
+  <Edit>DocumentLibraryForm</Edit>
+  <New>DocumentLibraryForm</New>
+</FormTemplates>
 </file>
 
-<file path=customXml/itemProps2.xml><?xml version="1.0" encoding="utf-8"?>
-<ds:datastoreItem xmlns:ds="http://schemas.openxmlformats.org/officeDocument/2006/customXml" ds:itemID="{1851D33F-E468-417B-A30C-509B68D2BD09}">
-  <ds:schemaRefs>
-    <ds:schemaRef ds:uri="http://schemas.microsoft.com/sharepoint/v3/contenttype/forms"/>
-  </ds:schemaRefs>
-</ds:datastoreItem>
+<file path=customXml/item3.xml><?xml version="1.0" encoding="utf-8"?>
+<p:properties xmlns:p="http://schemas.microsoft.com/office/2006/metadata/properties" xmlns:xsi="http://www.w3.org/2001/XMLSchema-instance">
+  <documentManagement>
+    <AVMTitle xmlns="5091c847-84be-4f4f-b16c-c018ad2ca66b">Präsentation BFH_2013</AVMTitle>
+  </documentManagement>
+</p:properties>
 </file>
 
-<file path=customXml/itemProps3.xml><?xml version="1.0" encoding="utf-8"?>
+<file path=customXml/itemProps1.xml><?xml version="1.0" encoding="utf-8"?>
 <ds:datastoreItem xmlns:ds="http://schemas.openxmlformats.org/officeDocument/2006/customXml" ds:itemID="{15287BEA-F3FF-4B87-929B-5D0092183197}">
   <ds:schemaRefs>
     <ds:schemaRef ds:uri="http://schemas.microsoft.com/office/2006/metadata/contentType"/>
@@ -11772,4 +12538,27 @@
     <ds:schemaRef ds:uri="http://schemas.microsoft.com/office/internal/2005/internalDocumentation"/>
   </ds:schemaRefs>
 </ds:datastoreItem>
+</file>
+
+<file path=customXml/itemProps2.xml><?xml version="1.0" encoding="utf-8"?>
+<ds:datastoreItem xmlns:ds="http://schemas.openxmlformats.org/officeDocument/2006/customXml" ds:itemID="{1851D33F-E468-417B-A30C-509B68D2BD09}">
+  <ds:schemaRefs>
+    <ds:schemaRef ds:uri="http://schemas.microsoft.com/sharepoint/v3/contenttype/forms"/>
+  </ds:schemaRefs>
+</ds:datastoreItem>
+</file>
+
+<file path=customXml/itemProps3.xml><?xml version="1.0" encoding="utf-8"?>
+<ds:datastoreItem xmlns:ds="http://schemas.openxmlformats.org/officeDocument/2006/customXml" ds:itemID="{32991507-CB83-4F49-BAFB-D322B1D04098}">
+  <ds:schemaRefs>
+    <ds:schemaRef ds:uri="http://purl.org/dc/terms/"/>
+    <ds:schemaRef ds:uri="http://purl.org/dc/elements/1.1/"/>
+    <ds:schemaRef ds:uri="http://www.w3.org/XML/1998/namespace"/>
+    <ds:schemaRef ds:uri="http://schemas.microsoft.com/office/2006/documentManagement/types"/>
+    <ds:schemaRef ds:uri="http://schemas.openxmlformats.org/package/2006/metadata/core-properties"/>
+    <ds:schemaRef ds:uri="5091c847-84be-4f4f-b16c-c018ad2ca66b"/>
+    <ds:schemaRef ds:uri="http://schemas.microsoft.com/office/2006/metadata/properties"/>
+    <ds:schemaRef ds:uri="http://purl.org/dc/dcmitype/"/>
+  </ds:schemaRefs>
+</ds:datastoreItem>
 </file>
</xml_diff>

<commit_message>
Mi Chabis isch iz ono dinne
</commit_message>
<xml_diff>
--- a/doc/Task14/task14_presentation Schlurp.pptx
+++ b/doc/Task14/task14_presentation Schlurp.pptx
@@ -5,10 +5,10 @@
     <p:sldMasterId id="2147483669" r:id="rId4"/>
   </p:sldMasterIdLst>
   <p:notesMasterIdLst>
-    <p:notesMasterId r:id="rId25"/>
+    <p:notesMasterId r:id="rId27"/>
   </p:notesMasterIdLst>
   <p:handoutMasterIdLst>
-    <p:handoutMasterId r:id="rId26"/>
+    <p:handoutMasterId r:id="rId28"/>
   </p:handoutMasterIdLst>
   <p:sldIdLst>
     <p:sldId id="259" r:id="rId5"/>
@@ -23,14 +23,16 @@
     <p:sldId id="305" r:id="rId14"/>
     <p:sldId id="318" r:id="rId15"/>
     <p:sldId id="306" r:id="rId16"/>
-    <p:sldId id="310" r:id="rId17"/>
-    <p:sldId id="311" r:id="rId18"/>
-    <p:sldId id="312" r:id="rId19"/>
-    <p:sldId id="313" r:id="rId20"/>
-    <p:sldId id="314" r:id="rId21"/>
-    <p:sldId id="315" r:id="rId22"/>
-    <p:sldId id="316" r:id="rId23"/>
-    <p:sldId id="299" r:id="rId24"/>
+    <p:sldId id="323" r:id="rId17"/>
+    <p:sldId id="324" r:id="rId18"/>
+    <p:sldId id="310" r:id="rId19"/>
+    <p:sldId id="311" r:id="rId20"/>
+    <p:sldId id="312" r:id="rId21"/>
+    <p:sldId id="313" r:id="rId22"/>
+    <p:sldId id="314" r:id="rId23"/>
+    <p:sldId id="315" r:id="rId24"/>
+    <p:sldId id="316" r:id="rId25"/>
+    <p:sldId id="299" r:id="rId26"/>
   </p:sldIdLst>
   <p:sldSz cx="9144000" cy="6858000" type="screen4x3"/>
   <p:notesSz cx="6669088" cy="9926638"/>
@@ -869,7 +871,7 @@
           <a:p>
             <a:r>
               <a:rPr lang="de-CH" dirty="0" smtClean="0"/>
-              <a:t>Kaspar</a:t>
+              <a:t>Mauro</a:t>
             </a:r>
             <a:endParaRPr lang="de-CH" dirty="0"/>
           </a:p>
@@ -892,7 +894,7 @@
           <a:p>
             <a:fld id="{37E44704-8E6D-4CF2-8CFA-A0F7BC751896}" type="slidenum">
               <a:rPr lang="de-CH" smtClean="0"/>
-              <a:t>18</a:t>
+              <a:t>19</a:t>
             </a:fld>
             <a:endParaRPr lang="de-CH"/>
           </a:p>
@@ -901,7 +903,7 @@
     </p:spTree>
     <p:extLst>
       <p:ext uri="{BB962C8B-B14F-4D97-AF65-F5344CB8AC3E}">
-        <p14:creationId xmlns:p14="http://schemas.microsoft.com/office/powerpoint/2010/main" val="1986255681"/>
+        <p14:creationId xmlns:p14="http://schemas.microsoft.com/office/powerpoint/2010/main" val="3001186816"/>
       </p:ext>
     </p:extLst>
   </p:cSld>
@@ -957,7 +959,7 @@
           <a:p>
             <a:r>
               <a:rPr lang="de-CH" dirty="0" smtClean="0"/>
-              <a:t>Maurice</a:t>
+              <a:t>Kaspar</a:t>
             </a:r>
             <a:endParaRPr lang="de-CH" dirty="0"/>
           </a:p>
@@ -980,7 +982,95 @@
           <a:p>
             <a:fld id="{37E44704-8E6D-4CF2-8CFA-A0F7BC751896}" type="slidenum">
               <a:rPr lang="de-CH" smtClean="0"/>
-              <a:t>19</a:t>
+              <a:t>20</a:t>
+            </a:fld>
+            <a:endParaRPr lang="de-CH"/>
+          </a:p>
+        </p:txBody>
+      </p:sp>
+    </p:spTree>
+    <p:extLst>
+      <p:ext uri="{BB962C8B-B14F-4D97-AF65-F5344CB8AC3E}">
+        <p14:creationId xmlns:p14="http://schemas.microsoft.com/office/powerpoint/2010/main" val="1986255681"/>
+      </p:ext>
+    </p:extLst>
+  </p:cSld>
+  <p:clrMapOvr>
+    <a:masterClrMapping/>
+  </p:clrMapOvr>
+</p:notes>
+</file>
+
+<file path=ppt/notesSlides/notesSlide12.xml><?xml version="1.0" encoding="utf-8"?>
+<p:notes xmlns:a="http://schemas.openxmlformats.org/drawingml/2006/main" xmlns:r="http://schemas.openxmlformats.org/officeDocument/2006/relationships" xmlns:p="http://schemas.openxmlformats.org/presentationml/2006/main">
+  <p:cSld>
+    <p:spTree>
+      <p:nvGrpSpPr>
+        <p:cNvPr id="1" name=""/>
+        <p:cNvGrpSpPr/>
+        <p:nvPr/>
+      </p:nvGrpSpPr>
+      <p:grpSpPr>
+        <a:xfrm>
+          <a:off x="0" y="0"/>
+          <a:ext cx="0" cy="0"/>
+          <a:chOff x="0" y="0"/>
+          <a:chExt cx="0" cy="0"/>
+        </a:xfrm>
+      </p:grpSpPr>
+      <p:sp>
+        <p:nvSpPr>
+          <p:cNvPr id="2" name="Folienbildplatzhalter 1"/>
+          <p:cNvSpPr>
+            <a:spLocks noGrp="1" noRot="1" noChangeAspect="1"/>
+          </p:cNvSpPr>
+          <p:nvPr>
+            <p:ph type="sldImg"/>
+          </p:nvPr>
+        </p:nvSpPr>
+        <p:spPr/>
+      </p:sp>
+      <p:sp>
+        <p:nvSpPr>
+          <p:cNvPr id="3" name="Notizenplatzhalter 2"/>
+          <p:cNvSpPr>
+            <a:spLocks noGrp="1"/>
+          </p:cNvSpPr>
+          <p:nvPr>
+            <p:ph type="body" idx="1"/>
+          </p:nvPr>
+        </p:nvSpPr>
+        <p:spPr/>
+        <p:txBody>
+          <a:bodyPr/>
+          <a:lstStyle/>
+          <a:p>
+            <a:r>
+              <a:rPr lang="de-CH" dirty="0" smtClean="0"/>
+              <a:t>Maurice</a:t>
+            </a:r>
+            <a:endParaRPr lang="de-CH" dirty="0"/>
+          </a:p>
+        </p:txBody>
+      </p:sp>
+      <p:sp>
+        <p:nvSpPr>
+          <p:cNvPr id="4" name="Foliennummernplatzhalter 3"/>
+          <p:cNvSpPr>
+            <a:spLocks noGrp="1"/>
+          </p:cNvSpPr>
+          <p:nvPr>
+            <p:ph type="sldNum" sz="quarter" idx="10"/>
+          </p:nvPr>
+        </p:nvSpPr>
+        <p:spPr/>
+        <p:txBody>
+          <a:bodyPr/>
+          <a:lstStyle/>
+          <a:p>
+            <a:fld id="{37E44704-8E6D-4CF2-8CFA-A0F7BC751896}" type="slidenum">
+              <a:rPr lang="de-CH" smtClean="0"/>
+              <a:t>21</a:t>
             </a:fld>
             <a:endParaRPr lang="de-CH"/>
           </a:p>
@@ -1677,10 +1767,6 @@
           <a:bodyPr/>
           <a:lstStyle/>
           <a:p>
-            <a:r>
-              <a:rPr lang="de-CH" dirty="0" smtClean="0"/>
-              <a:t>Philipp</a:t>
-            </a:r>
             <a:endParaRPr lang="de-CH" dirty="0"/>
           </a:p>
         </p:txBody>
@@ -1702,7 +1788,7 @@
           <a:p>
             <a:fld id="{37E44704-8E6D-4CF2-8CFA-A0F7BC751896}" type="slidenum">
               <a:rPr lang="de-CH" smtClean="0"/>
-              <a:t>13</a:t>
+              <a:t>14</a:t>
             </a:fld>
             <a:endParaRPr lang="de-CH"/>
           </a:p>
@@ -1711,7 +1797,7 @@
     </p:spTree>
     <p:extLst>
       <p:ext uri="{BB962C8B-B14F-4D97-AF65-F5344CB8AC3E}">
-        <p14:creationId xmlns:p14="http://schemas.microsoft.com/office/powerpoint/2010/main" val="1717229326"/>
+        <p14:creationId xmlns:p14="http://schemas.microsoft.com/office/powerpoint/2010/main" val="1697288178"/>
       </p:ext>
     </p:extLst>
   </p:cSld>
@@ -1767,7 +1853,7 @@
           <a:p>
             <a:r>
               <a:rPr lang="de-CH" dirty="0" smtClean="0"/>
-              <a:t>Rea</a:t>
+              <a:t>Philipp</a:t>
             </a:r>
             <a:endParaRPr lang="de-CH" dirty="0"/>
           </a:p>
@@ -1790,7 +1876,7 @@
           <a:p>
             <a:fld id="{37E44704-8E6D-4CF2-8CFA-A0F7BC751896}" type="slidenum">
               <a:rPr lang="de-CH" smtClean="0"/>
-              <a:t>14</a:t>
+              <a:t>15</a:t>
             </a:fld>
             <a:endParaRPr lang="de-CH"/>
           </a:p>
@@ -1799,7 +1885,7 @@
     </p:spTree>
     <p:extLst>
       <p:ext uri="{BB962C8B-B14F-4D97-AF65-F5344CB8AC3E}">
-        <p14:creationId xmlns:p14="http://schemas.microsoft.com/office/powerpoint/2010/main" val="1090606107"/>
+        <p14:creationId xmlns:p14="http://schemas.microsoft.com/office/powerpoint/2010/main" val="1717229326"/>
       </p:ext>
     </p:extLst>
   </p:cSld>
@@ -1855,7 +1941,7 @@
           <a:p>
             <a:r>
               <a:rPr lang="de-CH" dirty="0" smtClean="0"/>
-              <a:t>Maurice</a:t>
+              <a:t>Rea</a:t>
             </a:r>
             <a:endParaRPr lang="de-CH" dirty="0"/>
           </a:p>
@@ -1878,7 +1964,7 @@
           <a:p>
             <a:fld id="{37E44704-8E6D-4CF2-8CFA-A0F7BC751896}" type="slidenum">
               <a:rPr lang="de-CH" smtClean="0"/>
-              <a:t>15</a:t>
+              <a:t>16</a:t>
             </a:fld>
             <a:endParaRPr lang="de-CH"/>
           </a:p>
@@ -1887,7 +1973,7 @@
     </p:spTree>
     <p:extLst>
       <p:ext uri="{BB962C8B-B14F-4D97-AF65-F5344CB8AC3E}">
-        <p14:creationId xmlns:p14="http://schemas.microsoft.com/office/powerpoint/2010/main" val="3685268980"/>
+        <p14:creationId xmlns:p14="http://schemas.microsoft.com/office/powerpoint/2010/main" val="1090606107"/>
       </p:ext>
     </p:extLst>
   </p:cSld>
@@ -1943,7 +2029,7 @@
           <a:p>
             <a:r>
               <a:rPr lang="de-CH" dirty="0" smtClean="0"/>
-              <a:t>Mauro</a:t>
+              <a:t>Maurice</a:t>
             </a:r>
             <a:endParaRPr lang="de-CH" dirty="0"/>
           </a:p>
@@ -1966,7 +2052,7 @@
           <a:p>
             <a:fld id="{37E44704-8E6D-4CF2-8CFA-A0F7BC751896}" type="slidenum">
               <a:rPr lang="de-CH" smtClean="0"/>
-              <a:t>16</a:t>
+              <a:t>17</a:t>
             </a:fld>
             <a:endParaRPr lang="de-CH"/>
           </a:p>
@@ -1975,7 +2061,7 @@
     </p:spTree>
     <p:extLst>
       <p:ext uri="{BB962C8B-B14F-4D97-AF65-F5344CB8AC3E}">
-        <p14:creationId xmlns:p14="http://schemas.microsoft.com/office/powerpoint/2010/main" val="2267613444"/>
+        <p14:creationId xmlns:p14="http://schemas.microsoft.com/office/powerpoint/2010/main" val="3685268980"/>
       </p:ext>
     </p:extLst>
   </p:cSld>
@@ -2054,7 +2140,7 @@
           <a:p>
             <a:fld id="{37E44704-8E6D-4CF2-8CFA-A0F7BC751896}" type="slidenum">
               <a:rPr lang="de-CH" smtClean="0"/>
-              <a:t>17</a:t>
+              <a:t>18</a:t>
             </a:fld>
             <a:endParaRPr lang="de-CH"/>
           </a:p>
@@ -2063,7 +2149,7 @@
     </p:spTree>
     <p:extLst>
       <p:ext uri="{BB962C8B-B14F-4D97-AF65-F5344CB8AC3E}">
-        <p14:creationId xmlns:p14="http://schemas.microsoft.com/office/powerpoint/2010/main" val="3001186816"/>
+        <p14:creationId xmlns:p14="http://schemas.microsoft.com/office/powerpoint/2010/main" val="2267613444"/>
       </p:ext>
     </p:extLst>
   </p:cSld>
@@ -9652,7 +9738,73 @@
           <a:bodyPr/>
           <a:lstStyle/>
           <a:p>
-            <a:endParaRPr lang="de-CH"/>
+            <a:r>
+              <a:rPr lang="de-CH" dirty="0"/>
+              <a:t>Remove </a:t>
+            </a:r>
+            <a:r>
+              <a:rPr lang="de-CH" dirty="0" err="1"/>
+              <a:t>function</a:t>
+            </a:r>
+            <a:r>
+              <a:rPr lang="de-CH" dirty="0"/>
+              <a:t> </a:t>
+            </a:r>
+            <a:r>
+              <a:rPr lang="de-CH" dirty="0" err="1"/>
+              <a:t>for</a:t>
+            </a:r>
+            <a:r>
+              <a:rPr lang="de-CH" dirty="0"/>
+              <a:t> GUI </a:t>
+            </a:r>
+            <a:r>
+              <a:rPr lang="de-CH" dirty="0" err="1"/>
+              <a:t>MedicationListView</a:t>
+            </a:r>
+            <a:endParaRPr lang="de-CH" dirty="0"/>
+          </a:p>
+          <a:p>
+            <a:r>
+              <a:rPr lang="de-CH" dirty="0"/>
+              <a:t>Medicament.java</a:t>
+            </a:r>
+          </a:p>
+          <a:p>
+            <a:r>
+              <a:rPr lang="de-CH" dirty="0"/>
+              <a:t>Person.java</a:t>
+            </a:r>
+          </a:p>
+          <a:p>
+            <a:pPr lvl="1"/>
+            <a:r>
+              <a:rPr lang="de-CH" dirty="0"/>
+              <a:t>Patient.java</a:t>
+            </a:r>
+          </a:p>
+          <a:p>
+            <a:pPr lvl="1"/>
+            <a:r>
+              <a:rPr lang="de-CH" dirty="0"/>
+              <a:t>FamilyMember.java</a:t>
+            </a:r>
+          </a:p>
+          <a:p>
+            <a:pPr lvl="1"/>
+            <a:r>
+              <a:rPr lang="de-CH" dirty="0"/>
+              <a:t>Doctor.java</a:t>
+            </a:r>
+          </a:p>
+          <a:p>
+            <a:r>
+              <a:rPr lang="de-CH" dirty="0"/>
+              <a:t>Random GIF-Button</a:t>
+            </a:r>
+          </a:p>
+          <a:p>
+            <a:endParaRPr lang="de-CH" dirty="0"/>
           </a:p>
         </p:txBody>
       </p:sp>
@@ -9695,12 +9847,12 @@
       </p:grpSpPr>
       <p:sp>
         <p:nvSpPr>
-          <p:cNvPr id="6" name="Inhaltsplatzhalter 5"/>
+          <p:cNvPr id="3" name="Titel 2"/>
           <p:cNvSpPr>
             <a:spLocks noGrp="1"/>
           </p:cNvSpPr>
           <p:nvPr>
-            <p:ph sz="half" idx="1"/>
+            <p:ph type="ctrTitle"/>
           </p:nvPr>
         </p:nvSpPr>
         <p:spPr/>
@@ -9709,107 +9861,78 @@
           <a:lstStyle/>
           <a:p>
             <a:r>
-              <a:rPr lang="de-CH" dirty="0" smtClean="0"/>
-              <a:t>Schwierigkeiten</a:t>
-            </a:r>
-          </a:p>
-          <a:p>
-            <a:pPr lvl="1"/>
-            <a:r>
-              <a:rPr lang="de-CH" dirty="0" smtClean="0"/>
-              <a:t>Viele Unklarheiten Theorie-Praxis</a:t>
-            </a:r>
-          </a:p>
-          <a:p>
-            <a:pPr lvl="1"/>
-            <a:r>
-              <a:rPr lang="de-CH" dirty="0" smtClean="0"/>
-              <a:t>Fehlende Erfahrung</a:t>
-            </a:r>
-          </a:p>
-          <a:p>
-            <a:pPr lvl="1"/>
-            <a:r>
-              <a:rPr lang="de-CH" dirty="0" smtClean="0"/>
-              <a:t>Keine Vorstellung für Umsetzungsmöglichkeiten</a:t>
-            </a:r>
-          </a:p>
-          <a:p>
+              <a:rPr lang="de-DE" b="1" dirty="0" smtClean="0"/>
+              <a:t>Persönliche Beiträge</a:t>
+            </a:r>
             <a:endParaRPr lang="de-CH" dirty="0"/>
           </a:p>
-          <a:p>
-            <a:r>
-              <a:rPr lang="de-CH" dirty="0" err="1" smtClean="0"/>
-              <a:t>Lessons</a:t>
-            </a:r>
-            <a:r>
-              <a:rPr lang="de-CH" dirty="0" smtClean="0"/>
-              <a:t> </a:t>
-            </a:r>
-            <a:r>
-              <a:rPr lang="de-CH" dirty="0" err="1" smtClean="0"/>
-              <a:t>learned</a:t>
-            </a:r>
-            <a:endParaRPr lang="de-CH" dirty="0" smtClean="0"/>
-          </a:p>
-          <a:p>
-            <a:pPr lvl="1"/>
-            <a:r>
-              <a:rPr lang="de-CH" dirty="0" smtClean="0"/>
-              <a:t>Konsumentensicht</a:t>
-            </a:r>
-          </a:p>
-          <a:p>
-            <a:pPr lvl="1"/>
-            <a:r>
-              <a:rPr lang="de-CH" dirty="0" smtClean="0"/>
-              <a:t>Viele Ideen entwickeln</a:t>
-            </a:r>
-          </a:p>
-          <a:p>
-            <a:pPr lvl="1"/>
-            <a:r>
-              <a:rPr lang="de-CH" dirty="0" smtClean="0"/>
-              <a:t>Noch nicht an Umsetzung denken</a:t>
-            </a:r>
-          </a:p>
-        </p:txBody>
-      </p:sp>
-      <p:sp>
-        <p:nvSpPr>
-          <p:cNvPr id="5" name="Titel 4"/>
+        </p:txBody>
+      </p:sp>
+      <p:sp>
+        <p:nvSpPr>
+          <p:cNvPr id="5" name="Textplatzhalter 4"/>
           <p:cNvSpPr>
             <a:spLocks noGrp="1"/>
           </p:cNvSpPr>
           <p:nvPr>
-            <p:ph type="ctrTitle"/>
-          </p:nvPr>
-        </p:nvSpPr>
-        <p:spPr/>
+            <p:ph type="body" idx="1"/>
+          </p:nvPr>
+        </p:nvSpPr>
+        <p:spPr>
+          <a:xfrm>
+            <a:off x="468000" y="990000"/>
+            <a:ext cx="8100000" cy="540000"/>
+          </a:xfrm>
+        </p:spPr>
         <p:txBody>
           <a:bodyPr/>
           <a:lstStyle/>
           <a:p>
-            <a:pPr algn="ctr"/>
             <a:r>
               <a:rPr lang="de-CH" dirty="0" smtClean="0"/>
-              <a:t>Prozess </a:t>
-            </a:r>
-            <a:br>
-              <a:rPr lang="de-CH" dirty="0" smtClean="0"/>
-            </a:br>
-            <a:r>
-              <a:rPr lang="de-CH" sz="2000" dirty="0" smtClean="0"/>
-              <a:t>Storyboard</a:t>
-            </a:r>
-            <a:endParaRPr lang="de-CH" sz="2200" dirty="0"/>
-          </a:p>
-        </p:txBody>
-      </p:sp>
+              <a:t>Mauro - Navigator</a:t>
+            </a:r>
+            <a:endParaRPr lang="de-CH" dirty="0"/>
+          </a:p>
+          <a:p>
+            <a:endParaRPr lang="de-CH" dirty="0"/>
+          </a:p>
+        </p:txBody>
+      </p:sp>
+      <p:pic>
+        <p:nvPicPr>
+          <p:cNvPr id="9" name="Grafik 8"/>
+          <p:cNvPicPr>
+            <a:picLocks noChangeAspect="1"/>
+          </p:cNvPicPr>
+          <p:nvPr/>
+        </p:nvPicPr>
+        <p:blipFill>
+          <a:blip r:embed="rId2">
+            <a:extLst>
+              <a:ext uri="{28A0092B-C50C-407E-A947-70E740481C1C}">
+                <a14:useLocalDpi xmlns:a14="http://schemas.microsoft.com/office/drawing/2010/main" val="0"/>
+              </a:ext>
+            </a:extLst>
+          </a:blip>
+          <a:stretch>
+            <a:fillRect/>
+          </a:stretch>
+        </p:blipFill>
+        <p:spPr>
+          <a:xfrm>
+            <a:off x="468000" y="1530000"/>
+            <a:ext cx="7249537" cy="4810796"/>
+          </a:xfrm>
+          <a:prstGeom prst="rect">
+            <a:avLst/>
+          </a:prstGeom>
+        </p:spPr>
+      </p:pic>
     </p:spTree>
     <p:extLst>
       <p:ext uri="{BB962C8B-B14F-4D97-AF65-F5344CB8AC3E}">
-        <p14:creationId xmlns:p14="http://schemas.microsoft.com/office/powerpoint/2010/main" val="352211297"/>
+        <p14:creationId xmlns:p14="http://schemas.microsoft.com/office/powerpoint/2010/main" val="942917662"/>
       </p:ext>
     </p:extLst>
   </p:cSld>
@@ -9845,12 +9968,12 @@
       </p:grpSpPr>
       <p:sp>
         <p:nvSpPr>
-          <p:cNvPr id="6" name="Inhaltsplatzhalter 5"/>
+          <p:cNvPr id="3" name="Titel 2"/>
           <p:cNvSpPr>
             <a:spLocks noGrp="1"/>
           </p:cNvSpPr>
           <p:nvPr>
-            <p:ph sz="half" idx="1"/>
+            <p:ph type="ctrTitle"/>
           </p:nvPr>
         </p:nvSpPr>
         <p:spPr/>
@@ -9859,126 +9982,121 @@
           <a:lstStyle/>
           <a:p>
             <a:r>
-              <a:rPr lang="de-CH" dirty="0" smtClean="0"/>
-              <a:t>Schwierigkeiten</a:t>
-            </a:r>
-          </a:p>
-          <a:p>
-            <a:pPr lvl="1"/>
-            <a:r>
-              <a:rPr lang="de-CH" dirty="0" smtClean="0"/>
-              <a:t>Viele Einflussfaktoren</a:t>
-            </a:r>
-          </a:p>
-          <a:p>
-            <a:pPr lvl="1"/>
-            <a:r>
-              <a:rPr lang="de-CH" dirty="0" smtClean="0"/>
-              <a:t>Fehlende Erfahrung</a:t>
+              <a:rPr lang="de-DE" b="1" dirty="0" smtClean="0"/>
+              <a:t>Persönliche Beiträge</a:t>
             </a:r>
             <a:endParaRPr lang="de-CH" dirty="0"/>
           </a:p>
-          <a:p>
-            <a:pPr lvl="1"/>
-            <a:endParaRPr lang="de-CH" dirty="0" smtClean="0"/>
-          </a:p>
-          <a:p>
-            <a:r>
-              <a:rPr lang="de-CH" dirty="0" err="1" smtClean="0"/>
-              <a:t>Lessons</a:t>
-            </a:r>
-            <a:r>
-              <a:rPr lang="de-CH" dirty="0" smtClean="0"/>
-              <a:t> </a:t>
-            </a:r>
-            <a:r>
-              <a:rPr lang="de-CH" dirty="0" err="1" smtClean="0"/>
-              <a:t>learned</a:t>
-            </a:r>
-            <a:endParaRPr lang="de-CH" dirty="0" smtClean="0"/>
-          </a:p>
-          <a:p>
-            <a:pPr lvl="1"/>
-            <a:r>
-              <a:rPr lang="de-CH" dirty="0" smtClean="0"/>
-              <a:t>Grundlage des Projekts</a:t>
-            </a:r>
-          </a:p>
-          <a:p>
-            <a:pPr lvl="1"/>
-            <a:r>
-              <a:rPr lang="de-CH" dirty="0" smtClean="0"/>
-              <a:t>Alle Faktoren berücksichtigen</a:t>
-            </a:r>
-          </a:p>
-          <a:p>
-            <a:pPr lvl="2"/>
-            <a:r>
-              <a:rPr lang="de-CH" dirty="0" smtClean="0"/>
-              <a:t>Richtlinien</a:t>
-            </a:r>
-          </a:p>
-          <a:p>
-            <a:pPr lvl="2"/>
-            <a:r>
-              <a:rPr lang="de-CH" dirty="0" smtClean="0"/>
-              <a:t>Kundenanforderungen</a:t>
-            </a:r>
-          </a:p>
-          <a:p>
-            <a:pPr lvl="2"/>
-            <a:r>
-              <a:rPr lang="de-CH" dirty="0" smtClean="0"/>
-              <a:t>…</a:t>
-            </a:r>
-          </a:p>
-          <a:p>
-            <a:pPr lvl="1"/>
-            <a:endParaRPr lang="de-CH" dirty="0"/>
-          </a:p>
-        </p:txBody>
-      </p:sp>
-      <p:sp>
-        <p:nvSpPr>
-          <p:cNvPr id="5" name="Titel 4"/>
+        </p:txBody>
+      </p:sp>
+      <p:sp>
+        <p:nvSpPr>
+          <p:cNvPr id="5" name="Textplatzhalter 4"/>
           <p:cNvSpPr>
             <a:spLocks noGrp="1"/>
           </p:cNvSpPr>
           <p:nvPr>
-            <p:ph type="ctrTitle"/>
-          </p:nvPr>
-        </p:nvSpPr>
-        <p:spPr/>
+            <p:ph type="body" idx="1"/>
+          </p:nvPr>
+        </p:nvSpPr>
+        <p:spPr>
+          <a:xfrm>
+            <a:off x="468000" y="990000"/>
+            <a:ext cx="8100000" cy="540000"/>
+          </a:xfrm>
+        </p:spPr>
         <p:txBody>
           <a:bodyPr/>
           <a:lstStyle/>
           <a:p>
-            <a:pPr algn="ctr"/>
             <a:r>
               <a:rPr lang="de-CH" dirty="0" smtClean="0"/>
-              <a:t>Prozess </a:t>
-            </a:r>
-            <a:br>
-              <a:rPr lang="de-CH" dirty="0" smtClean="0"/>
-            </a:br>
-            <a:r>
-              <a:rPr lang="de-CH" sz="2000" dirty="0" err="1" smtClean="0"/>
-              <a:t>Requirements</a:t>
-            </a:r>
-            <a:endParaRPr lang="de-CH" sz="2200" dirty="0"/>
-          </a:p>
-        </p:txBody>
-      </p:sp>
+              <a:t>Mauro - Navigator</a:t>
+            </a:r>
+            <a:endParaRPr lang="de-CH" dirty="0"/>
+          </a:p>
+          <a:p>
+            <a:endParaRPr lang="de-CH" dirty="0"/>
+          </a:p>
+        </p:txBody>
+      </p:sp>
+      <p:pic>
+        <p:nvPicPr>
+          <p:cNvPr id="7" name="Grafik 6"/>
+          <p:cNvPicPr>
+            <a:picLocks noChangeAspect="1"/>
+          </p:cNvPicPr>
+          <p:nvPr/>
+        </p:nvPicPr>
+        <p:blipFill>
+          <a:blip r:embed="rId3">
+            <a:extLst>
+              <a:ext uri="{28A0092B-C50C-407E-A947-70E740481C1C}">
+                <a14:useLocalDpi xmlns:a14="http://schemas.microsoft.com/office/drawing/2010/main" val="0"/>
+              </a:ext>
+            </a:extLst>
+          </a:blip>
+          <a:stretch>
+            <a:fillRect/>
+          </a:stretch>
+        </p:blipFill>
+        <p:spPr>
+          <a:xfrm>
+            <a:off x="366400" y="2029253"/>
+            <a:ext cx="5792008" cy="4305901"/>
+          </a:xfrm>
+          <a:prstGeom prst="rect">
+            <a:avLst/>
+          </a:prstGeom>
+        </p:spPr>
+      </p:pic>
+      <p:pic>
+        <p:nvPicPr>
+          <p:cNvPr id="8" name="Grafik 7"/>
+          <p:cNvPicPr>
+            <a:picLocks noChangeAspect="1"/>
+          </p:cNvPicPr>
+          <p:nvPr/>
+        </p:nvPicPr>
+        <p:blipFill>
+          <a:blip r:embed="rId4">
+            <a:extLst>
+              <a:ext uri="{28A0092B-C50C-407E-A947-70E740481C1C}">
+                <a14:useLocalDpi xmlns:a14="http://schemas.microsoft.com/office/drawing/2010/main" val="0"/>
+              </a:ext>
+            </a:extLst>
+          </a:blip>
+          <a:stretch>
+            <a:fillRect/>
+          </a:stretch>
+        </p:blipFill>
+        <p:spPr>
+          <a:xfrm>
+            <a:off x="468000" y="1489253"/>
+            <a:ext cx="6134956" cy="485843"/>
+          </a:xfrm>
+          <a:prstGeom prst="rect">
+            <a:avLst/>
+          </a:prstGeom>
+        </p:spPr>
+      </p:pic>
     </p:spTree>
     <p:extLst>
       <p:ext uri="{BB962C8B-B14F-4D97-AF65-F5344CB8AC3E}">
-        <p14:creationId xmlns:p14="http://schemas.microsoft.com/office/powerpoint/2010/main" val="1331511723"/>
+        <p14:creationId xmlns:p14="http://schemas.microsoft.com/office/powerpoint/2010/main" val="2765508802"/>
       </p:ext>
     </p:extLst>
   </p:cSld>
   <p:clrMapOvr>
     <a:masterClrMapping/>
   </p:clrMapOvr>
+  <p:timing>
+    <p:tnLst>
+      <p:par>
+        <p:cTn id="1" dur="indefinite" restart="never" nodeType="tmRoot"/>
+      </p:par>
+    </p:tnLst>
+  </p:timing>
 </p:sld>
 </file>
 
@@ -10023,37 +10141,25 @@
             <a:pPr lvl="1"/>
             <a:r>
               <a:rPr lang="de-CH" dirty="0" smtClean="0"/>
+              <a:t>Viele Unklarheiten Theorie-Praxis</a:t>
+            </a:r>
+          </a:p>
+          <a:p>
+            <a:pPr lvl="1"/>
+            <a:r>
+              <a:rPr lang="de-CH" dirty="0" smtClean="0"/>
               <a:t>Fehlende Erfahrung</a:t>
             </a:r>
           </a:p>
           <a:p>
-            <a:pPr lvl="2"/>
+            <a:pPr lvl="1"/>
             <a:r>
               <a:rPr lang="de-CH" dirty="0" smtClean="0"/>
-              <a:t>Wichtige Punkte vergessen</a:t>
-            </a:r>
-          </a:p>
-          <a:p>
-            <a:pPr lvl="1"/>
-            <a:r>
-              <a:rPr lang="de-CH" dirty="0" smtClean="0"/>
-              <a:t>Überblick behalten</a:t>
-            </a:r>
-          </a:p>
-          <a:p>
-            <a:pPr lvl="1"/>
-            <a:r>
-              <a:rPr lang="de-CH" dirty="0" smtClean="0"/>
-              <a:t>Anbindung an </a:t>
-            </a:r>
-            <a:r>
-              <a:rPr lang="de-CH" dirty="0" err="1" smtClean="0"/>
-              <a:t>Vaadin</a:t>
-            </a:r>
+              <a:t>Keine Vorstellung für Umsetzungsmöglichkeiten</a:t>
+            </a:r>
+          </a:p>
+          <a:p>
             <a:endParaRPr lang="de-CH" dirty="0"/>
-          </a:p>
-          <a:p>
-            <a:endParaRPr lang="de-CH" dirty="0" smtClean="0"/>
           </a:p>
           <a:p>
             <a:r>
@@ -10074,19 +10180,22 @@
             <a:pPr lvl="1"/>
             <a:r>
               <a:rPr lang="de-CH" dirty="0" smtClean="0"/>
-              <a:t>Ressourcen abklären</a:t>
+              <a:t>Konsumentensicht</a:t>
             </a:r>
           </a:p>
           <a:p>
             <a:pPr lvl="1"/>
             <a:r>
               <a:rPr lang="de-CH" dirty="0" smtClean="0"/>
-              <a:t>Externe Frameworks sind gut aber…</a:t>
+              <a:t>Viele Ideen entwickeln</a:t>
             </a:r>
           </a:p>
           <a:p>
             <a:pPr lvl="1"/>
-            <a:endParaRPr lang="de-CH" dirty="0"/>
+            <a:r>
+              <a:rPr lang="de-CH" dirty="0" smtClean="0"/>
+              <a:t>Noch nicht an Umsetzung denken</a:t>
+            </a:r>
           </a:p>
         </p:txBody>
       </p:sp>
@@ -10115,7 +10224,7 @@
             </a:br>
             <a:r>
               <a:rPr lang="de-CH" sz="2000" dirty="0" smtClean="0"/>
-              <a:t>Design</a:t>
+              <a:t>Storyboard</a:t>
             </a:r>
             <a:endParaRPr lang="de-CH" sz="2200" dirty="0"/>
           </a:p>
@@ -10124,13 +10233,20 @@
     </p:spTree>
     <p:extLst>
       <p:ext uri="{BB962C8B-B14F-4D97-AF65-F5344CB8AC3E}">
-        <p14:creationId xmlns:p14="http://schemas.microsoft.com/office/powerpoint/2010/main" val="1305885463"/>
+        <p14:creationId xmlns:p14="http://schemas.microsoft.com/office/powerpoint/2010/main" val="352211297"/>
       </p:ext>
     </p:extLst>
   </p:cSld>
   <p:clrMapOvr>
     <a:masterClrMapping/>
   </p:clrMapOvr>
+  <p:timing>
+    <p:tnLst>
+      <p:par>
+        <p:cTn id="1" dur="indefinite" restart="never" nodeType="tmRoot"/>
+      </p:par>
+    </p:tnLst>
+  </p:timing>
 </p:sld>
 </file>
 
@@ -10175,7 +10291,7 @@
             <a:pPr lvl="1"/>
             <a:r>
               <a:rPr lang="de-CH" dirty="0" smtClean="0"/>
-              <a:t>Arbeitsaufteilung</a:t>
+              <a:t>Viele Einflussfaktoren</a:t>
             </a:r>
           </a:p>
           <a:p>
@@ -10184,23 +10300,10 @@
               <a:rPr lang="de-CH" dirty="0" smtClean="0"/>
               <a:t>Fehlende Erfahrung</a:t>
             </a:r>
+            <a:endParaRPr lang="de-CH" dirty="0"/>
           </a:p>
           <a:p>
             <a:pPr lvl="1"/>
-            <a:r>
-              <a:rPr lang="de-CH" dirty="0" smtClean="0"/>
-              <a:t>Aufwand schätzen</a:t>
-            </a:r>
-          </a:p>
-          <a:p>
-            <a:pPr lvl="1"/>
-            <a:r>
-              <a:rPr lang="de-CH" dirty="0" smtClean="0"/>
-              <a:t>Machbarkeit einschätzen</a:t>
-            </a:r>
-            <a:endParaRPr lang="de-CH" dirty="0"/>
-          </a:p>
-          <a:p>
             <a:endParaRPr lang="de-CH" dirty="0" smtClean="0"/>
           </a:p>
           <a:p>
@@ -10222,25 +10325,35 @@
             <a:pPr lvl="1"/>
             <a:r>
               <a:rPr lang="de-CH" dirty="0" smtClean="0"/>
-              <a:t>Umgang mit Ressourcen</a:t>
+              <a:t>Grundlage des Projekts</a:t>
             </a:r>
           </a:p>
           <a:p>
             <a:pPr lvl="1"/>
             <a:r>
               <a:rPr lang="de-CH" dirty="0" smtClean="0"/>
-              <a:t>Teamarbeit</a:t>
-            </a:r>
-          </a:p>
-          <a:p>
-            <a:pPr lvl="1"/>
-            <a:r>
-              <a:rPr lang="de-CH" dirty="0" err="1" smtClean="0"/>
-              <a:t>Scrum</a:t>
-            </a:r>
+              <a:t>Alle Faktoren berücksichtigen</a:t>
+            </a:r>
+          </a:p>
+          <a:p>
+            <a:pPr lvl="2"/>
             <a:r>
               <a:rPr lang="de-CH" dirty="0" smtClean="0"/>
-              <a:t>-Vorgehensweise</a:t>
+              <a:t>Richtlinien</a:t>
+            </a:r>
+          </a:p>
+          <a:p>
+            <a:pPr lvl="2"/>
+            <a:r>
+              <a:rPr lang="de-CH" dirty="0" smtClean="0"/>
+              <a:t>Kundenanforderungen</a:t>
+            </a:r>
+          </a:p>
+          <a:p>
+            <a:pPr lvl="2"/>
+            <a:r>
+              <a:rPr lang="de-CH" dirty="0" smtClean="0"/>
+              <a:t>…</a:t>
             </a:r>
           </a:p>
           <a:p>
@@ -10273,8 +10386,8 @@
               <a:rPr lang="de-CH" dirty="0" smtClean="0"/>
             </a:br>
             <a:r>
-              <a:rPr lang="de-CH" sz="2000" dirty="0" smtClean="0"/>
-              <a:t>Implementation</a:t>
+              <a:rPr lang="de-CH" sz="2000" dirty="0" err="1" smtClean="0"/>
+              <a:t>Requirements</a:t>
             </a:r>
             <a:endParaRPr lang="de-CH" sz="2200" dirty="0"/>
           </a:p>
@@ -10283,7 +10396,7 @@
     </p:spTree>
     <p:extLst>
       <p:ext uri="{BB962C8B-B14F-4D97-AF65-F5344CB8AC3E}">
-        <p14:creationId xmlns:p14="http://schemas.microsoft.com/office/powerpoint/2010/main" val="2523521946"/>
+        <p14:creationId xmlns:p14="http://schemas.microsoft.com/office/powerpoint/2010/main" val="1331511723"/>
       </p:ext>
     </p:extLst>
   </p:cSld>
@@ -10312,12 +10425,12 @@
       </p:grpSpPr>
       <p:sp>
         <p:nvSpPr>
-          <p:cNvPr id="3" name="Titel 2"/>
+          <p:cNvPr id="6" name="Inhaltsplatzhalter 5"/>
           <p:cNvSpPr>
             <a:spLocks noGrp="1"/>
           </p:cNvSpPr>
           <p:nvPr>
-            <p:ph type="ctrTitle"/>
+            <p:ph sz="half" idx="1"/>
           </p:nvPr>
         </p:nvSpPr>
         <p:spPr/>
@@ -10326,96 +10439,116 @@
           <a:lstStyle/>
           <a:p>
             <a:r>
-              <a:rPr lang="de-DE" b="1" dirty="0" err="1" smtClean="0"/>
-              <a:t>Scrum</a:t>
-            </a:r>
-            <a:r>
-              <a:rPr lang="de-DE" b="1" dirty="0" smtClean="0"/>
-              <a:t> Master</a:t>
+              <a:rPr lang="de-CH" dirty="0" smtClean="0"/>
+              <a:t>Schwierigkeiten</a:t>
+            </a:r>
+          </a:p>
+          <a:p>
+            <a:pPr lvl="1"/>
+            <a:r>
+              <a:rPr lang="de-CH" dirty="0" smtClean="0"/>
+              <a:t>Fehlende Erfahrung</a:t>
+            </a:r>
+          </a:p>
+          <a:p>
+            <a:pPr lvl="2"/>
+            <a:r>
+              <a:rPr lang="de-CH" dirty="0" smtClean="0"/>
+              <a:t>Wichtige Punkte vergessen</a:t>
+            </a:r>
+          </a:p>
+          <a:p>
+            <a:pPr lvl="1"/>
+            <a:r>
+              <a:rPr lang="de-CH" dirty="0" smtClean="0"/>
+              <a:t>Überblick behalten</a:t>
+            </a:r>
+          </a:p>
+          <a:p>
+            <a:pPr lvl="1"/>
+            <a:r>
+              <a:rPr lang="de-CH" dirty="0" smtClean="0"/>
+              <a:t>Anbindung an </a:t>
+            </a:r>
+            <a:r>
+              <a:rPr lang="de-CH" dirty="0" err="1" smtClean="0"/>
+              <a:t>Vaadin</a:t>
             </a:r>
             <a:endParaRPr lang="de-CH" dirty="0"/>
           </a:p>
-        </p:txBody>
-      </p:sp>
-      <p:sp>
-        <p:nvSpPr>
-          <p:cNvPr id="6" name="Inhaltsplatzhalter 5"/>
+          <a:p>
+            <a:endParaRPr lang="de-CH" dirty="0" smtClean="0"/>
+          </a:p>
+          <a:p>
+            <a:r>
+              <a:rPr lang="de-CH" dirty="0" err="1" smtClean="0"/>
+              <a:t>Lessons</a:t>
+            </a:r>
+            <a:r>
+              <a:rPr lang="de-CH" dirty="0" smtClean="0"/>
+              <a:t> </a:t>
+            </a:r>
+            <a:r>
+              <a:rPr lang="de-CH" dirty="0" err="1" smtClean="0"/>
+              <a:t>learned</a:t>
+            </a:r>
+            <a:endParaRPr lang="de-CH" dirty="0" smtClean="0"/>
+          </a:p>
+          <a:p>
+            <a:pPr lvl="1"/>
+            <a:r>
+              <a:rPr lang="de-CH" dirty="0" smtClean="0"/>
+              <a:t>Ressourcen abklären</a:t>
+            </a:r>
+          </a:p>
+          <a:p>
+            <a:pPr lvl="1"/>
+            <a:r>
+              <a:rPr lang="de-CH" dirty="0" smtClean="0"/>
+              <a:t>Externe Frameworks sind gut aber…</a:t>
+            </a:r>
+          </a:p>
+          <a:p>
+            <a:pPr lvl="1"/>
+            <a:endParaRPr lang="de-CH" dirty="0"/>
+          </a:p>
+        </p:txBody>
+      </p:sp>
+      <p:sp>
+        <p:nvSpPr>
+          <p:cNvPr id="5" name="Titel 4"/>
           <p:cNvSpPr>
             <a:spLocks noGrp="1"/>
           </p:cNvSpPr>
           <p:nvPr>
-            <p:ph sz="half" idx="13"/>
-          </p:nvPr>
-        </p:nvSpPr>
-        <p:spPr>
-          <a:xfrm>
-            <a:off x="468000" y="1099750"/>
-            <a:ext cx="8100000" cy="5020249"/>
-          </a:xfrm>
-        </p:spPr>
+            <p:ph type="ctrTitle"/>
+          </p:nvPr>
+        </p:nvSpPr>
+        <p:spPr/>
         <p:txBody>
           <a:bodyPr/>
           <a:lstStyle/>
           <a:p>
-            <a:r>
-              <a:rPr lang="de-CH" dirty="0" err="1" smtClean="0"/>
-              <a:t>Lessons</a:t>
-            </a:r>
+            <a:pPr algn="ctr"/>
             <a:r>
               <a:rPr lang="de-CH" dirty="0" smtClean="0"/>
-              <a:t> </a:t>
-            </a:r>
-            <a:r>
-              <a:rPr lang="de-CH" dirty="0" err="1" smtClean="0"/>
-              <a:t>learned</a:t>
-            </a:r>
-            <a:endParaRPr lang="de-CH" dirty="0" smtClean="0"/>
-          </a:p>
-          <a:p>
-            <a:pPr lvl="1"/>
-            <a:r>
+              <a:t>Prozess </a:t>
+            </a:r>
+            <a:br>
               <a:rPr lang="de-CH" dirty="0" smtClean="0"/>
-              <a:t>Unterschiedliche Fähigkeiten des Teams</a:t>
-            </a:r>
-          </a:p>
-          <a:p>
-            <a:pPr lvl="1"/>
-            <a:r>
-              <a:rPr lang="de-CH" dirty="0" smtClean="0"/>
-              <a:t>Zeitplanung</a:t>
-            </a:r>
-          </a:p>
-          <a:p>
-            <a:pPr lvl="1"/>
-            <a:r>
-              <a:rPr lang="de-CH" dirty="0" smtClean="0"/>
-              <a:t>Fehlende Erfahrung</a:t>
-            </a:r>
-          </a:p>
-          <a:p>
-            <a:pPr lvl="1"/>
-            <a:r>
-              <a:rPr lang="de-CH" dirty="0" smtClean="0"/>
-              <a:t>Prioritäten setzen</a:t>
-            </a:r>
-          </a:p>
-          <a:p>
-            <a:pPr lvl="1"/>
-            <a:r>
-              <a:rPr lang="de-CH" dirty="0" smtClean="0"/>
-              <a:t>Überblick behalten</a:t>
-            </a:r>
-          </a:p>
-          <a:p>
-            <a:pPr lvl="1"/>
-            <a:endParaRPr lang="de-CH" dirty="0" smtClean="0"/>
+            </a:br>
+            <a:r>
+              <a:rPr lang="de-CH" sz="2000" dirty="0" smtClean="0"/>
+              <a:t>Design</a:t>
+            </a:r>
+            <a:endParaRPr lang="de-CH" sz="2200" dirty="0"/>
           </a:p>
         </p:txBody>
       </p:sp>
     </p:spTree>
     <p:extLst>
       <p:ext uri="{BB962C8B-B14F-4D97-AF65-F5344CB8AC3E}">
-        <p14:creationId xmlns:p14="http://schemas.microsoft.com/office/powerpoint/2010/main" val="3305796004"/>
+        <p14:creationId xmlns:p14="http://schemas.microsoft.com/office/powerpoint/2010/main" val="1305885463"/>
       </p:ext>
     </p:extLst>
   </p:cSld>
@@ -10444,12 +10577,12 @@
       </p:grpSpPr>
       <p:sp>
         <p:nvSpPr>
-          <p:cNvPr id="3" name="Titel 2"/>
+          <p:cNvPr id="6" name="Inhaltsplatzhalter 5"/>
           <p:cNvSpPr>
             <a:spLocks noGrp="1"/>
           </p:cNvSpPr>
           <p:nvPr>
-            <p:ph type="ctrTitle"/>
+            <p:ph sz="half" idx="1"/>
           </p:nvPr>
         </p:nvSpPr>
         <p:spPr/>
@@ -10458,135 +10591,123 @@
           <a:lstStyle/>
           <a:p>
             <a:r>
-              <a:rPr lang="de-DE" b="1" dirty="0" err="1" smtClean="0"/>
+              <a:rPr lang="de-CH" dirty="0" smtClean="0"/>
+              <a:t>Schwierigkeiten</a:t>
+            </a:r>
+          </a:p>
+          <a:p>
+            <a:pPr lvl="1"/>
+            <a:r>
+              <a:rPr lang="de-CH" dirty="0" smtClean="0"/>
+              <a:t>Arbeitsaufteilung</a:t>
+            </a:r>
+          </a:p>
+          <a:p>
+            <a:pPr lvl="1"/>
+            <a:r>
+              <a:rPr lang="de-CH" dirty="0" smtClean="0"/>
+              <a:t>Fehlende Erfahrung</a:t>
+            </a:r>
+          </a:p>
+          <a:p>
+            <a:pPr lvl="1"/>
+            <a:r>
+              <a:rPr lang="de-CH" dirty="0" smtClean="0"/>
+              <a:t>Aufwand schätzen</a:t>
+            </a:r>
+          </a:p>
+          <a:p>
+            <a:pPr lvl="1"/>
+            <a:r>
+              <a:rPr lang="de-CH" dirty="0" smtClean="0"/>
+              <a:t>Machbarkeit einschätzen</a:t>
+            </a:r>
+            <a:endParaRPr lang="de-CH" dirty="0"/>
+          </a:p>
+          <a:p>
+            <a:endParaRPr lang="de-CH" dirty="0" smtClean="0"/>
+          </a:p>
+          <a:p>
+            <a:r>
+              <a:rPr lang="de-CH" dirty="0" err="1" smtClean="0"/>
+              <a:t>Lessons</a:t>
+            </a:r>
+            <a:r>
+              <a:rPr lang="de-CH" dirty="0" smtClean="0"/>
+              <a:t> </a:t>
+            </a:r>
+            <a:r>
+              <a:rPr lang="de-CH" dirty="0" err="1" smtClean="0"/>
+              <a:t>learned</a:t>
+            </a:r>
+            <a:endParaRPr lang="de-CH" dirty="0" smtClean="0"/>
+          </a:p>
+          <a:p>
+            <a:pPr lvl="1"/>
+            <a:r>
+              <a:rPr lang="de-CH" dirty="0" smtClean="0"/>
+              <a:t>Umgang mit Ressourcen</a:t>
+            </a:r>
+          </a:p>
+          <a:p>
+            <a:pPr lvl="1"/>
+            <a:r>
+              <a:rPr lang="de-CH" dirty="0" smtClean="0"/>
+              <a:t>Teamarbeit</a:t>
+            </a:r>
+          </a:p>
+          <a:p>
+            <a:pPr lvl="1"/>
+            <a:r>
+              <a:rPr lang="de-CH" dirty="0" err="1" smtClean="0"/>
               <a:t>Scrum</a:t>
             </a:r>
             <a:r>
-              <a:rPr lang="de-DE" b="1" dirty="0" smtClean="0"/>
-              <a:t> Member</a:t>
-            </a:r>
+              <a:rPr lang="de-CH" dirty="0" smtClean="0"/>
+              <a:t>-Vorgehensweise</a:t>
+            </a:r>
+          </a:p>
+          <a:p>
+            <a:pPr lvl="1"/>
             <a:endParaRPr lang="de-CH" dirty="0"/>
           </a:p>
         </p:txBody>
       </p:sp>
       <p:sp>
         <p:nvSpPr>
-          <p:cNvPr id="6" name="Inhaltsplatzhalter 5"/>
+          <p:cNvPr id="5" name="Titel 4"/>
           <p:cNvSpPr>
             <a:spLocks noGrp="1"/>
           </p:cNvSpPr>
           <p:nvPr>
-            <p:ph sz="half" idx="13"/>
-          </p:nvPr>
-        </p:nvSpPr>
-        <p:spPr>
-          <a:xfrm>
-            <a:off x="468000" y="1099750"/>
-            <a:ext cx="8100000" cy="5020249"/>
-          </a:xfrm>
-        </p:spPr>
+            <p:ph type="ctrTitle"/>
+          </p:nvPr>
+        </p:nvSpPr>
+        <p:spPr/>
         <p:txBody>
           <a:bodyPr/>
           <a:lstStyle/>
           <a:p>
-            <a:r>
-              <a:rPr lang="de-CH" dirty="0" err="1" smtClean="0"/>
-              <a:t>Lessons</a:t>
-            </a:r>
+            <a:pPr algn="ctr"/>
             <a:r>
               <a:rPr lang="de-CH" dirty="0" smtClean="0"/>
-              <a:t> </a:t>
-            </a:r>
-            <a:r>
-              <a:rPr lang="de-CH" dirty="0" err="1" smtClean="0"/>
-              <a:t>learned</a:t>
-            </a:r>
-            <a:endParaRPr lang="de-CH" dirty="0" smtClean="0"/>
-          </a:p>
-          <a:p>
-            <a:pPr lvl="1"/>
-            <a:r>
+              <a:t>Prozess </a:t>
+            </a:r>
+            <a:br>
               <a:rPr lang="de-CH" dirty="0" smtClean="0"/>
-              <a:t>Daily </a:t>
-            </a:r>
-            <a:r>
-              <a:rPr lang="de-CH" dirty="0" err="1" smtClean="0"/>
-              <a:t>Scrum</a:t>
-            </a:r>
-            <a:r>
-              <a:rPr lang="de-CH" dirty="0" smtClean="0"/>
-              <a:t> wichtig für</a:t>
-            </a:r>
-          </a:p>
-          <a:p>
-            <a:pPr lvl="2"/>
-            <a:r>
-              <a:rPr lang="de-CH" dirty="0" smtClean="0"/>
-              <a:t>Arbeitsaufteilung</a:t>
-            </a:r>
-          </a:p>
-          <a:p>
-            <a:pPr lvl="2"/>
-            <a:r>
-              <a:rPr lang="de-CH" dirty="0" smtClean="0"/>
-              <a:t>Fortschritt</a:t>
-            </a:r>
-          </a:p>
-          <a:p>
-            <a:pPr lvl="2"/>
-            <a:r>
-              <a:rPr lang="de-CH" dirty="0" smtClean="0"/>
-              <a:t>Lösungssuche</a:t>
-            </a:r>
-          </a:p>
-          <a:p>
-            <a:pPr lvl="1"/>
-            <a:r>
-              <a:rPr lang="de-CH" dirty="0" smtClean="0"/>
-              <a:t>Dokumente </a:t>
-            </a:r>
-            <a:r>
-              <a:rPr lang="de-CH" dirty="0" err="1" smtClean="0"/>
-              <a:t>up</a:t>
-            </a:r>
-            <a:r>
-              <a:rPr lang="de-CH" dirty="0" smtClean="0"/>
-              <a:t> </a:t>
-            </a:r>
-            <a:r>
-              <a:rPr lang="de-CH" dirty="0" err="1" smtClean="0"/>
-              <a:t>to</a:t>
-            </a:r>
-            <a:r>
-              <a:rPr lang="de-CH" dirty="0" smtClean="0"/>
-              <a:t> </a:t>
-            </a:r>
-            <a:r>
-              <a:rPr lang="de-CH" dirty="0" err="1" smtClean="0"/>
-              <a:t>date</a:t>
-            </a:r>
-            <a:r>
-              <a:rPr lang="de-CH" dirty="0" smtClean="0"/>
-              <a:t> halten</a:t>
-            </a:r>
-          </a:p>
-          <a:p>
-            <a:pPr lvl="1"/>
-            <a:r>
-              <a:rPr lang="de-CH" dirty="0" smtClean="0"/>
-              <a:t>Zeitplanung</a:t>
-            </a:r>
-          </a:p>
-          <a:p>
-            <a:pPr lvl="1"/>
-            <a:endParaRPr lang="de-CH" dirty="0"/>
+            </a:br>
+            <a:r>
+              <a:rPr lang="de-CH" sz="2000" dirty="0" smtClean="0"/>
+              <a:t>Implementation</a:t>
+            </a:r>
+            <a:endParaRPr lang="de-CH" sz="2200" dirty="0"/>
           </a:p>
         </p:txBody>
       </p:sp>
     </p:spTree>
     <p:extLst>
       <p:ext uri="{BB962C8B-B14F-4D97-AF65-F5344CB8AC3E}">
-        <p14:creationId xmlns:p14="http://schemas.microsoft.com/office/powerpoint/2010/main" val="611237871"/>
+        <p14:creationId xmlns:p14="http://schemas.microsoft.com/office/powerpoint/2010/main" val="2523521946"/>
       </p:ext>
     </p:extLst>
   </p:cSld>
@@ -10630,47 +10751,11 @@
           <a:p>
             <a:r>
               <a:rPr lang="de-DE" b="1" dirty="0" err="1" smtClean="0"/>
-              <a:t>You</a:t>
+              <a:t>Scrum</a:t>
             </a:r>
             <a:r>
               <a:rPr lang="de-DE" b="1" dirty="0" smtClean="0"/>
-              <a:t>, </a:t>
-            </a:r>
-            <a:r>
-              <a:rPr lang="de-DE" b="1" dirty="0" err="1" smtClean="0"/>
-              <a:t>your</a:t>
-            </a:r>
-            <a:r>
-              <a:rPr lang="de-DE" b="1" dirty="0" smtClean="0"/>
-              <a:t> </a:t>
-            </a:r>
-            <a:r>
-              <a:rPr lang="de-DE" b="1" dirty="0" err="1" smtClean="0"/>
-              <a:t>team</a:t>
-            </a:r>
-            <a:r>
-              <a:rPr lang="de-DE" b="1" dirty="0" smtClean="0"/>
-              <a:t> </a:t>
-            </a:r>
-            <a:r>
-              <a:rPr lang="de-DE" b="1" dirty="0" err="1" smtClean="0"/>
-              <a:t>and</a:t>
-            </a:r>
-            <a:r>
-              <a:rPr lang="de-DE" b="1" dirty="0" smtClean="0"/>
-              <a:t> </a:t>
-            </a:r>
-            <a:r>
-              <a:rPr lang="de-DE" b="1" dirty="0" err="1" smtClean="0"/>
-              <a:t>the</a:t>
-            </a:r>
-            <a:r>
-              <a:rPr lang="de-DE" b="1" dirty="0" smtClean="0"/>
-              <a:t> </a:t>
-            </a:r>
-            <a:r>
-              <a:rPr lang="de-DE" b="1" dirty="0" err="1" smtClean="0"/>
-              <a:t>course</a:t>
+              <a:t> Master</a:t>
             </a:r>
             <a:endParaRPr lang="de-CH" dirty="0"/>
           </a:p>
@@ -10696,71 +10781,65 @@
           <a:bodyPr/>
           <a:lstStyle/>
           <a:p>
+            <a:r>
+              <a:rPr lang="de-CH" dirty="0" err="1" smtClean="0"/>
+              <a:t>Lessons</a:t>
+            </a:r>
+            <a:r>
+              <a:rPr lang="de-CH" dirty="0" smtClean="0"/>
+              <a:t> </a:t>
+            </a:r>
+            <a:r>
+              <a:rPr lang="de-CH" dirty="0" err="1" smtClean="0"/>
+              <a:t>learned</a:t>
+            </a:r>
+            <a:endParaRPr lang="de-CH" dirty="0" smtClean="0"/>
+          </a:p>
+          <a:p>
             <a:pPr lvl="1"/>
             <a:r>
-              <a:rPr lang="de-CH" dirty="0"/>
-              <a:t>Eigenverantwortung </a:t>
-            </a:r>
-            <a:r>
               <a:rPr lang="de-CH" dirty="0" smtClean="0"/>
-              <a:t>für das gesamte Projekt</a:t>
+              <a:t>Unterschiedliche Fähigkeiten des Teams</a:t>
             </a:r>
           </a:p>
           <a:p>
             <a:pPr lvl="1"/>
             <a:r>
               <a:rPr lang="de-CH" dirty="0" smtClean="0"/>
-              <a:t>Unbekanntes Framework</a:t>
+              <a:t>Zeitplanung</a:t>
             </a:r>
           </a:p>
           <a:p>
             <a:pPr lvl="1"/>
             <a:r>
               <a:rPr lang="de-CH" dirty="0" smtClean="0"/>
-              <a:t>Umsetzung Theorie – Praxis</a:t>
-            </a:r>
-          </a:p>
-          <a:p>
-            <a:pPr lvl="2"/>
+              <a:t>Fehlende Erfahrung</a:t>
+            </a:r>
+          </a:p>
+          <a:p>
+            <a:pPr lvl="1"/>
             <a:r>
               <a:rPr lang="de-CH" dirty="0" smtClean="0"/>
-              <a:t>Klassendiagram</a:t>
-            </a:r>
-          </a:p>
-          <a:p>
-            <a:pPr lvl="2"/>
+              <a:t>Prioritäten setzen</a:t>
+            </a:r>
+          </a:p>
+          <a:p>
+            <a:pPr lvl="1"/>
             <a:r>
               <a:rPr lang="de-CH" dirty="0" smtClean="0"/>
-              <a:t>Medikamentenübersicht</a:t>
+              <a:t>Überblick behalten</a:t>
             </a:r>
           </a:p>
           <a:p>
             <a:pPr lvl="1"/>
-            <a:r>
-              <a:rPr lang="de-CH" dirty="0" smtClean="0"/>
-              <a:t>Semesterplanung</a:t>
-            </a:r>
-          </a:p>
-          <a:p>
-            <a:pPr lvl="2"/>
-            <a:r>
-              <a:rPr lang="de-CH" dirty="0" smtClean="0"/>
-              <a:t>Aufteilung Theorie – Projektarbeit</a:t>
-            </a:r>
-          </a:p>
-          <a:p>
-            <a:pPr lvl="1"/>
-            <a:r>
-              <a:rPr lang="de-CH" dirty="0" smtClean="0"/>
-              <a:t>Teamarbeit schwierig wenn Personen abwesend</a:t>
-            </a:r>
+            <a:endParaRPr lang="de-CH" dirty="0" smtClean="0"/>
           </a:p>
         </p:txBody>
       </p:sp>
     </p:spTree>
     <p:extLst>
       <p:ext uri="{BB962C8B-B14F-4D97-AF65-F5344CB8AC3E}">
-        <p14:creationId xmlns:p14="http://schemas.microsoft.com/office/powerpoint/2010/main" val="3438071427"/>
+        <p14:creationId xmlns:p14="http://schemas.microsoft.com/office/powerpoint/2010/main" val="3305796004"/>
       </p:ext>
     </p:extLst>
   </p:cSld>
@@ -11052,6 +11131,351 @@
 </file>
 
 <file path=ppt/slides/slide20.xml><?xml version="1.0" encoding="utf-8"?>
+<p:sld xmlns:a="http://schemas.openxmlformats.org/drawingml/2006/main" xmlns:r="http://schemas.openxmlformats.org/officeDocument/2006/relationships" xmlns:p="http://schemas.openxmlformats.org/presentationml/2006/main">
+  <p:cSld>
+    <p:spTree>
+      <p:nvGrpSpPr>
+        <p:cNvPr id="1" name=""/>
+        <p:cNvGrpSpPr/>
+        <p:nvPr/>
+      </p:nvGrpSpPr>
+      <p:grpSpPr>
+        <a:xfrm>
+          <a:off x="0" y="0"/>
+          <a:ext cx="0" cy="0"/>
+          <a:chOff x="0" y="0"/>
+          <a:chExt cx="0" cy="0"/>
+        </a:xfrm>
+      </p:grpSpPr>
+      <p:sp>
+        <p:nvSpPr>
+          <p:cNvPr id="3" name="Titel 2"/>
+          <p:cNvSpPr>
+            <a:spLocks noGrp="1"/>
+          </p:cNvSpPr>
+          <p:nvPr>
+            <p:ph type="ctrTitle"/>
+          </p:nvPr>
+        </p:nvSpPr>
+        <p:spPr/>
+        <p:txBody>
+          <a:bodyPr/>
+          <a:lstStyle/>
+          <a:p>
+            <a:r>
+              <a:rPr lang="de-DE" b="1" dirty="0" err="1" smtClean="0"/>
+              <a:t>Scrum</a:t>
+            </a:r>
+            <a:r>
+              <a:rPr lang="de-DE" b="1" dirty="0" smtClean="0"/>
+              <a:t> Member</a:t>
+            </a:r>
+            <a:endParaRPr lang="de-CH" dirty="0"/>
+          </a:p>
+        </p:txBody>
+      </p:sp>
+      <p:sp>
+        <p:nvSpPr>
+          <p:cNvPr id="6" name="Inhaltsplatzhalter 5"/>
+          <p:cNvSpPr>
+            <a:spLocks noGrp="1"/>
+          </p:cNvSpPr>
+          <p:nvPr>
+            <p:ph sz="half" idx="13"/>
+          </p:nvPr>
+        </p:nvSpPr>
+        <p:spPr>
+          <a:xfrm>
+            <a:off x="468000" y="1099750"/>
+            <a:ext cx="8100000" cy="5020249"/>
+          </a:xfrm>
+        </p:spPr>
+        <p:txBody>
+          <a:bodyPr/>
+          <a:lstStyle/>
+          <a:p>
+            <a:r>
+              <a:rPr lang="de-CH" dirty="0" err="1" smtClean="0"/>
+              <a:t>Lessons</a:t>
+            </a:r>
+            <a:r>
+              <a:rPr lang="de-CH" dirty="0" smtClean="0"/>
+              <a:t> </a:t>
+            </a:r>
+            <a:r>
+              <a:rPr lang="de-CH" dirty="0" err="1" smtClean="0"/>
+              <a:t>learned</a:t>
+            </a:r>
+            <a:endParaRPr lang="de-CH" dirty="0" smtClean="0"/>
+          </a:p>
+          <a:p>
+            <a:pPr lvl="1"/>
+            <a:r>
+              <a:rPr lang="de-CH" dirty="0" smtClean="0"/>
+              <a:t>Daily </a:t>
+            </a:r>
+            <a:r>
+              <a:rPr lang="de-CH" dirty="0" err="1" smtClean="0"/>
+              <a:t>Scrum</a:t>
+            </a:r>
+            <a:r>
+              <a:rPr lang="de-CH" dirty="0" smtClean="0"/>
+              <a:t> wichtig für</a:t>
+            </a:r>
+          </a:p>
+          <a:p>
+            <a:pPr lvl="2"/>
+            <a:r>
+              <a:rPr lang="de-CH" dirty="0" smtClean="0"/>
+              <a:t>Arbeitsaufteilung</a:t>
+            </a:r>
+          </a:p>
+          <a:p>
+            <a:pPr lvl="2"/>
+            <a:r>
+              <a:rPr lang="de-CH" dirty="0" smtClean="0"/>
+              <a:t>Fortschritt</a:t>
+            </a:r>
+          </a:p>
+          <a:p>
+            <a:pPr lvl="2"/>
+            <a:r>
+              <a:rPr lang="de-CH" dirty="0" smtClean="0"/>
+              <a:t>Lösungssuche</a:t>
+            </a:r>
+          </a:p>
+          <a:p>
+            <a:pPr lvl="1"/>
+            <a:r>
+              <a:rPr lang="de-CH" dirty="0" smtClean="0"/>
+              <a:t>Dokumente </a:t>
+            </a:r>
+            <a:r>
+              <a:rPr lang="de-CH" dirty="0" err="1" smtClean="0"/>
+              <a:t>up</a:t>
+            </a:r>
+            <a:r>
+              <a:rPr lang="de-CH" dirty="0" smtClean="0"/>
+              <a:t> </a:t>
+            </a:r>
+            <a:r>
+              <a:rPr lang="de-CH" dirty="0" err="1" smtClean="0"/>
+              <a:t>to</a:t>
+            </a:r>
+            <a:r>
+              <a:rPr lang="de-CH" dirty="0" smtClean="0"/>
+              <a:t> </a:t>
+            </a:r>
+            <a:r>
+              <a:rPr lang="de-CH" dirty="0" err="1" smtClean="0"/>
+              <a:t>date</a:t>
+            </a:r>
+            <a:r>
+              <a:rPr lang="de-CH" dirty="0" smtClean="0"/>
+              <a:t> halten</a:t>
+            </a:r>
+          </a:p>
+          <a:p>
+            <a:pPr lvl="1"/>
+            <a:r>
+              <a:rPr lang="de-CH" dirty="0" smtClean="0"/>
+              <a:t>Zeitplanung</a:t>
+            </a:r>
+          </a:p>
+          <a:p>
+            <a:pPr lvl="1"/>
+            <a:endParaRPr lang="de-CH" dirty="0"/>
+          </a:p>
+        </p:txBody>
+      </p:sp>
+    </p:spTree>
+    <p:extLst>
+      <p:ext uri="{BB962C8B-B14F-4D97-AF65-F5344CB8AC3E}">
+        <p14:creationId xmlns:p14="http://schemas.microsoft.com/office/powerpoint/2010/main" val="611237871"/>
+      </p:ext>
+    </p:extLst>
+  </p:cSld>
+  <p:clrMapOvr>
+    <a:masterClrMapping/>
+  </p:clrMapOvr>
+</p:sld>
+</file>
+
+<file path=ppt/slides/slide21.xml><?xml version="1.0" encoding="utf-8"?>
+<p:sld xmlns:a="http://schemas.openxmlformats.org/drawingml/2006/main" xmlns:r="http://schemas.openxmlformats.org/officeDocument/2006/relationships" xmlns:p="http://schemas.openxmlformats.org/presentationml/2006/main">
+  <p:cSld>
+    <p:spTree>
+      <p:nvGrpSpPr>
+        <p:cNvPr id="1" name=""/>
+        <p:cNvGrpSpPr/>
+        <p:nvPr/>
+      </p:nvGrpSpPr>
+      <p:grpSpPr>
+        <a:xfrm>
+          <a:off x="0" y="0"/>
+          <a:ext cx="0" cy="0"/>
+          <a:chOff x="0" y="0"/>
+          <a:chExt cx="0" cy="0"/>
+        </a:xfrm>
+      </p:grpSpPr>
+      <p:sp>
+        <p:nvSpPr>
+          <p:cNvPr id="3" name="Titel 2"/>
+          <p:cNvSpPr>
+            <a:spLocks noGrp="1"/>
+          </p:cNvSpPr>
+          <p:nvPr>
+            <p:ph type="ctrTitle"/>
+          </p:nvPr>
+        </p:nvSpPr>
+        <p:spPr/>
+        <p:txBody>
+          <a:bodyPr/>
+          <a:lstStyle/>
+          <a:p>
+            <a:r>
+              <a:rPr lang="de-DE" b="1" dirty="0" err="1" smtClean="0"/>
+              <a:t>You</a:t>
+            </a:r>
+            <a:r>
+              <a:rPr lang="de-DE" b="1" dirty="0" smtClean="0"/>
+              <a:t>, </a:t>
+            </a:r>
+            <a:r>
+              <a:rPr lang="de-DE" b="1" dirty="0" err="1" smtClean="0"/>
+              <a:t>your</a:t>
+            </a:r>
+            <a:r>
+              <a:rPr lang="de-DE" b="1" dirty="0" smtClean="0"/>
+              <a:t> </a:t>
+            </a:r>
+            <a:r>
+              <a:rPr lang="de-DE" b="1" dirty="0" err="1" smtClean="0"/>
+              <a:t>team</a:t>
+            </a:r>
+            <a:r>
+              <a:rPr lang="de-DE" b="1" dirty="0" smtClean="0"/>
+              <a:t> </a:t>
+            </a:r>
+            <a:r>
+              <a:rPr lang="de-DE" b="1" dirty="0" err="1" smtClean="0"/>
+              <a:t>and</a:t>
+            </a:r>
+            <a:r>
+              <a:rPr lang="de-DE" b="1" dirty="0" smtClean="0"/>
+              <a:t> </a:t>
+            </a:r>
+            <a:r>
+              <a:rPr lang="de-DE" b="1" dirty="0" err="1" smtClean="0"/>
+              <a:t>the</a:t>
+            </a:r>
+            <a:r>
+              <a:rPr lang="de-DE" b="1" dirty="0" smtClean="0"/>
+              <a:t> </a:t>
+            </a:r>
+            <a:r>
+              <a:rPr lang="de-DE" b="1" dirty="0" err="1" smtClean="0"/>
+              <a:t>course</a:t>
+            </a:r>
+            <a:endParaRPr lang="de-CH" dirty="0"/>
+          </a:p>
+        </p:txBody>
+      </p:sp>
+      <p:sp>
+        <p:nvSpPr>
+          <p:cNvPr id="6" name="Inhaltsplatzhalter 5"/>
+          <p:cNvSpPr>
+            <a:spLocks noGrp="1"/>
+          </p:cNvSpPr>
+          <p:nvPr>
+            <p:ph sz="half" idx="13"/>
+          </p:nvPr>
+        </p:nvSpPr>
+        <p:spPr>
+          <a:xfrm>
+            <a:off x="468000" y="1099750"/>
+            <a:ext cx="8100000" cy="5020249"/>
+          </a:xfrm>
+        </p:spPr>
+        <p:txBody>
+          <a:bodyPr/>
+          <a:lstStyle/>
+          <a:p>
+            <a:pPr lvl="1"/>
+            <a:r>
+              <a:rPr lang="de-CH" dirty="0"/>
+              <a:t>Eigenverantwortung </a:t>
+            </a:r>
+            <a:r>
+              <a:rPr lang="de-CH" dirty="0" smtClean="0"/>
+              <a:t>für das gesamte Projekt</a:t>
+            </a:r>
+          </a:p>
+          <a:p>
+            <a:pPr lvl="1"/>
+            <a:r>
+              <a:rPr lang="de-CH" dirty="0" smtClean="0"/>
+              <a:t>Unbekanntes Framework</a:t>
+            </a:r>
+          </a:p>
+          <a:p>
+            <a:pPr lvl="1"/>
+            <a:r>
+              <a:rPr lang="de-CH" dirty="0" smtClean="0"/>
+              <a:t>Umsetzung Theorie – Praxis</a:t>
+            </a:r>
+          </a:p>
+          <a:p>
+            <a:pPr lvl="2"/>
+            <a:r>
+              <a:rPr lang="de-CH" dirty="0" smtClean="0"/>
+              <a:t>Klassendiagram</a:t>
+            </a:r>
+          </a:p>
+          <a:p>
+            <a:pPr lvl="2"/>
+            <a:r>
+              <a:rPr lang="de-CH" dirty="0" smtClean="0"/>
+              <a:t>Medikamentenübersicht</a:t>
+            </a:r>
+          </a:p>
+          <a:p>
+            <a:pPr lvl="1"/>
+            <a:r>
+              <a:rPr lang="de-CH" dirty="0" smtClean="0"/>
+              <a:t>Semesterplanung</a:t>
+            </a:r>
+          </a:p>
+          <a:p>
+            <a:pPr lvl="2"/>
+            <a:r>
+              <a:rPr lang="de-CH" dirty="0" smtClean="0"/>
+              <a:t>Aufteilung Theorie – Projektarbeit</a:t>
+            </a:r>
+          </a:p>
+          <a:p>
+            <a:pPr lvl="1"/>
+            <a:r>
+              <a:rPr lang="de-CH" dirty="0" smtClean="0"/>
+              <a:t>Teamarbeit schwierig wenn Personen abwesend</a:t>
+            </a:r>
+          </a:p>
+        </p:txBody>
+      </p:sp>
+    </p:spTree>
+    <p:extLst>
+      <p:ext uri="{BB962C8B-B14F-4D97-AF65-F5344CB8AC3E}">
+        <p14:creationId xmlns:p14="http://schemas.microsoft.com/office/powerpoint/2010/main" val="3438071427"/>
+      </p:ext>
+    </p:extLst>
+  </p:cSld>
+  <p:clrMapOvr>
+    <a:masterClrMapping/>
+  </p:clrMapOvr>
+</p:sld>
+</file>
+
+<file path=ppt/slides/slide22.xml><?xml version="1.0" encoding="utf-8"?>
 <p:sld xmlns:a="http://schemas.openxmlformats.org/drawingml/2006/main" xmlns:r="http://schemas.openxmlformats.org/officeDocument/2006/relationships" xmlns:p="http://schemas.openxmlformats.org/presentationml/2006/main">
   <p:cSld>
     <p:spTree>
@@ -13332,11 +13756,12 @@
 </file>
 
 <file path=customXml/item1.xml><?xml version="1.0" encoding="utf-8"?>
-<p:properties xmlns:p="http://schemas.microsoft.com/office/2006/metadata/properties" xmlns:xsi="http://www.w3.org/2001/XMLSchema-instance">
-  <documentManagement>
-    <AVMTitle xmlns="5091c847-84be-4f4f-b16c-c018ad2ca66b">Präsentation BFH_2013</AVMTitle>
-  </documentManagement>
-</p:properties>
+<?mso-contentType ?>
+<FormTemplates xmlns="http://schemas.microsoft.com/sharepoint/v3/contenttype/forms">
+  <Display>DocumentLibraryForm</Display>
+  <Edit>DocumentLibraryForm</Edit>
+  <New>DocumentLibraryForm</New>
+</FormTemplates>
 </file>
 
 <file path=customXml/item2.xml><?xml version="1.0" encoding="utf-8"?>
@@ -13400,25 +13825,17 @@
 </file>
 
 <file path=customXml/item3.xml><?xml version="1.0" encoding="utf-8"?>
-<?mso-contentType ?>
-<FormTemplates xmlns="http://schemas.microsoft.com/sharepoint/v3/contenttype/forms">
-  <Display>DocumentLibraryForm</Display>
-  <Edit>DocumentLibraryForm</Edit>
-  <New>DocumentLibraryForm</New>
-</FormTemplates>
+<p:properties xmlns:p="http://schemas.microsoft.com/office/2006/metadata/properties" xmlns:xsi="http://www.w3.org/2001/XMLSchema-instance">
+  <documentManagement>
+    <AVMTitle xmlns="5091c847-84be-4f4f-b16c-c018ad2ca66b">Präsentation BFH_2013</AVMTitle>
+  </documentManagement>
+</p:properties>
 </file>
 
 <file path=customXml/itemProps1.xml><?xml version="1.0" encoding="utf-8"?>
-<ds:datastoreItem xmlns:ds="http://schemas.openxmlformats.org/officeDocument/2006/customXml" ds:itemID="{32991507-CB83-4F49-BAFB-D322B1D04098}">
+<ds:datastoreItem xmlns:ds="http://schemas.openxmlformats.org/officeDocument/2006/customXml" ds:itemID="{1851D33F-E468-417B-A30C-509B68D2BD09}">
   <ds:schemaRefs>
-    <ds:schemaRef ds:uri="http://purl.org/dc/terms/"/>
-    <ds:schemaRef ds:uri="http://purl.org/dc/elements/1.1/"/>
-    <ds:schemaRef ds:uri="http://www.w3.org/XML/1998/namespace"/>
-    <ds:schemaRef ds:uri="http://schemas.microsoft.com/office/2006/documentManagement/types"/>
-    <ds:schemaRef ds:uri="http://schemas.openxmlformats.org/package/2006/metadata/core-properties"/>
-    <ds:schemaRef ds:uri="5091c847-84be-4f4f-b16c-c018ad2ca66b"/>
-    <ds:schemaRef ds:uri="http://schemas.microsoft.com/office/2006/metadata/properties"/>
-    <ds:schemaRef ds:uri="http://purl.org/dc/dcmitype/"/>
+    <ds:schemaRef ds:uri="http://schemas.microsoft.com/sharepoint/v3/contenttype/forms"/>
   </ds:schemaRefs>
 </ds:datastoreItem>
 </file>
@@ -13441,9 +13858,16 @@
 </file>
 
 <file path=customXml/itemProps3.xml><?xml version="1.0" encoding="utf-8"?>
-<ds:datastoreItem xmlns:ds="http://schemas.openxmlformats.org/officeDocument/2006/customXml" ds:itemID="{1851D33F-E468-417B-A30C-509B68D2BD09}">
+<ds:datastoreItem xmlns:ds="http://schemas.openxmlformats.org/officeDocument/2006/customXml" ds:itemID="{32991507-CB83-4F49-BAFB-D322B1D04098}">
   <ds:schemaRefs>
-    <ds:schemaRef ds:uri="http://schemas.microsoft.com/sharepoint/v3/contenttype/forms"/>
+    <ds:schemaRef ds:uri="http://purl.org/dc/terms/"/>
+    <ds:schemaRef ds:uri="http://purl.org/dc/elements/1.1/"/>
+    <ds:schemaRef ds:uri="http://www.w3.org/XML/1998/namespace"/>
+    <ds:schemaRef ds:uri="http://schemas.microsoft.com/office/2006/documentManagement/types"/>
+    <ds:schemaRef ds:uri="http://schemas.openxmlformats.org/package/2006/metadata/core-properties"/>
+    <ds:schemaRef ds:uri="5091c847-84be-4f4f-b16c-c018ad2ca66b"/>
+    <ds:schemaRef ds:uri="http://schemas.microsoft.com/office/2006/metadata/properties"/>
+    <ds:schemaRef ds:uri="http://purl.org/dc/dcmitype/"/>
   </ds:schemaRefs>
 </ds:datastoreItem>
 </file>
</xml_diff>

<commit_message>
edit ppt (remove animation etc.)
</commit_message>
<xml_diff>
--- a/doc/Task14/task14_presentation Schlurp.pptx
+++ b/doc/Task14/task14_presentation Schlurp.pptx
@@ -276,7 +276,7 @@
           <a:p>
             <a:fld id="{EFA0D184-D464-48E9-9CA0-A94E873F6C2C}" type="datetimeFigureOut">
               <a:rPr lang="de-CH" smtClean="0"/>
-              <a:t>21.01.2016</a:t>
+              <a:t>tt.01.jjjj</a:t>
             </a:fld>
             <a:endParaRPr lang="de-CH"/>
           </a:p>
@@ -441,7 +441,7 @@
           <a:p>
             <a:fld id="{5AF2B663-2BA9-4D7E-8201-5DE4109E1EDD}" type="datetimeFigureOut">
               <a:rPr lang="de-CH" smtClean="0"/>
-              <a:t>21.01.2016</a:t>
+              <a:t>tt.01.jjjj</a:t>
             </a:fld>
             <a:endParaRPr lang="de-CH"/>
           </a:p>
@@ -8874,23 +8874,26 @@
           <a:p>
             <a:pPr lvl="1"/>
             <a:r>
+              <a:rPr lang="de-CH" dirty="0" err="1" smtClean="0"/>
+              <a:t>DrugTakeWrapper</a:t>
+            </a:r>
+            <a:endParaRPr lang="de-CH" dirty="0" smtClean="0"/>
+          </a:p>
+          <a:p>
+            <a:pPr lvl="1"/>
+            <a:r>
+              <a:rPr lang="de-CH" dirty="0" err="1" smtClean="0"/>
+              <a:t>DrugWrapper</a:t>
+            </a:r>
+            <a:endParaRPr lang="de-CH" dirty="0" smtClean="0"/>
+          </a:p>
+          <a:p>
+            <a:pPr lvl="1"/>
+            <a:r>
               <a:rPr lang="de-CH" dirty="0" smtClean="0"/>
-              <a:t>DrugTakeWrapper.java</a:t>
-            </a:r>
-          </a:p>
-          <a:p>
-            <a:pPr lvl="1"/>
-            <a:r>
-              <a:rPr lang="de-CH" dirty="0" smtClean="0"/>
-              <a:t>DrugWrapper.java</a:t>
-            </a:r>
-          </a:p>
-          <a:p>
-            <a:pPr lvl="1"/>
-            <a:r>
-              <a:rPr lang="de-CH" dirty="0" smtClean="0"/>
-              <a:t>Wrapper.java</a:t>
-            </a:r>
+              <a:t>Wrapper</a:t>
+            </a:r>
+            <a:endParaRPr lang="de-CH" dirty="0" smtClean="0"/>
           </a:p>
           <a:p>
             <a:r>
@@ -8901,29 +8904,32 @@
           <a:p>
             <a:pPr lvl="1"/>
             <a:r>
-              <a:rPr lang="de-CH" dirty="0" smtClean="0"/>
-              <a:t>HomeView.java</a:t>
-            </a:r>
+              <a:rPr lang="de-CH" dirty="0" err="1" smtClean="0"/>
+              <a:t>HomeView</a:t>
+            </a:r>
+            <a:endParaRPr lang="de-CH" dirty="0" smtClean="0"/>
           </a:p>
           <a:p>
             <a:pPr lvl="1"/>
             <a:r>
-              <a:rPr lang="de-CH" dirty="0" smtClean="0"/>
-              <a:t>InfoView.java</a:t>
-            </a:r>
+              <a:rPr lang="de-CH" dirty="0" err="1" smtClean="0"/>
+              <a:t>InfoView</a:t>
+            </a:r>
+            <a:endParaRPr lang="de-CH" dirty="0" smtClean="0"/>
           </a:p>
           <a:p>
             <a:pPr lvl="1"/>
             <a:r>
-              <a:rPr lang="de-CH" dirty="0" smtClean="0"/>
-              <a:t>MedicationsListView.java</a:t>
-            </a:r>
+              <a:rPr lang="de-CH" dirty="0" err="1" smtClean="0"/>
+              <a:t>MedicationsListView</a:t>
+            </a:r>
+            <a:endParaRPr lang="de-CH" dirty="0" smtClean="0"/>
           </a:p>
           <a:p>
             <a:pPr lvl="1"/>
             <a:r>
-              <a:rPr lang="de-CH" dirty="0" smtClean="0"/>
-              <a:t>MedicationsView.java </a:t>
+              <a:rPr lang="de-CH" dirty="0" err="1" smtClean="0"/>
+              <a:t>MedicationsView</a:t>
             </a:r>
             <a:endParaRPr lang="de-CH" dirty="0"/>
           </a:p>
@@ -8939,13 +8945,6 @@
   <p:clrMapOvr>
     <a:masterClrMapping/>
   </p:clrMapOvr>
-  <p:timing>
-    <p:tnLst>
-      <p:par>
-        <p:cTn id="1" dur="indefinite" restart="never" nodeType="tmRoot"/>
-      </p:par>
-    </p:tnLst>
-  </p:timing>
 </p:sld>
 </file>
 
@@ -9655,13 +9654,6 @@
   <p:clrMapOvr>
     <a:masterClrMapping/>
   </p:clrMapOvr>
-  <p:timing>
-    <p:tnLst>
-      <p:par>
-        <p:cTn id="1" dur="indefinite" restart="never" nodeType="tmRoot"/>
-      </p:par>
-    </p:tnLst>
-  </p:timing>
 </p:sld>
 </file>
 
@@ -9839,13 +9831,6 @@
   <p:clrMapOvr>
     <a:masterClrMapping/>
   </p:clrMapOvr>
-  <p:timing>
-    <p:tnLst>
-      <p:par>
-        <p:cTn id="1" dur="indefinite" restart="never" nodeType="tmRoot"/>
-      </p:par>
-    </p:tnLst>
-  </p:timing>
 </p:sld>
 </file>
 
@@ -9960,13 +9945,6 @@
   <p:clrMapOvr>
     <a:masterClrMapping/>
   </p:clrMapOvr>
-  <p:timing>
-    <p:tnLst>
-      <p:par>
-        <p:cTn id="1" dur="indefinite" restart="never" nodeType="tmRoot"/>
-      </p:par>
-    </p:tnLst>
-  </p:timing>
 </p:sld>
 </file>
 
@@ -10111,13 +10089,6 @@
   <p:clrMapOvr>
     <a:masterClrMapping/>
   </p:clrMapOvr>
-  <p:timing>
-    <p:tnLst>
-      <p:par>
-        <p:cTn id="1" dur="indefinite" restart="never" nodeType="tmRoot"/>
-      </p:par>
-    </p:tnLst>
-  </p:timing>
 </p:sld>
 </file>
 
@@ -10261,13 +10232,6 @@
   <p:clrMapOvr>
     <a:masterClrMapping/>
   </p:clrMapOvr>
-  <p:timing>
-    <p:tnLst>
-      <p:par>
-        <p:cTn id="1" dur="indefinite" restart="never" nodeType="tmRoot"/>
-      </p:par>
-    </p:tnLst>
-  </p:timing>
 </p:sld>
 </file>
 
@@ -10319,11 +10283,7 @@
             <a:pPr lvl="1"/>
             <a:r>
               <a:rPr lang="de-CH" dirty="0" smtClean="0"/>
-              <a:t>Fehlende </a:t>
-            </a:r>
-            <a:r>
-              <a:rPr lang="de-CH" dirty="0" smtClean="0"/>
-              <a:t>Erfahrung</a:t>
+              <a:t>Fehlende Erfahrung</a:t>
             </a:r>
           </a:p>
           <a:p>
@@ -10977,195 +10937,14 @@
   <p:clrMapOvr>
     <a:masterClrMapping/>
   </p:clrMapOvr>
-  <mc:AlternateContent xmlns:mc="http://schemas.openxmlformats.org/markup-compatibility/2006" xmlns:p14="http://schemas.microsoft.com/office/powerpoint/2010/main">
-    <mc:Choice Requires="p14">
-      <p:transition spd="med" p14:dur="700">
-        <p:fade/>
-      </p:transition>
+  <mc:AlternateContent xmlns:mc="http://schemas.openxmlformats.org/markup-compatibility/2006">
+    <mc:Choice xmlns:p14="http://schemas.microsoft.com/office/powerpoint/2010/main" Requires="p14">
+      <p:transition p14:dur="10"/>
     </mc:Choice>
-    <mc:Fallback xmlns="">
-      <p:transition spd="med">
-        <p:fade/>
-      </p:transition>
+    <mc:Fallback>
+      <p:transition/>
     </mc:Fallback>
   </mc:AlternateContent>
-  <p:timing>
-    <p:tnLst>
-      <p:par>
-        <p:cTn id="1" dur="indefinite" restart="never" nodeType="tmRoot">
-          <p:childTnLst>
-            <p:seq concurrent="1" nextAc="seek">
-              <p:cTn id="2" dur="indefinite" nodeType="mainSeq">
-                <p:childTnLst>
-                  <p:par>
-                    <p:cTn id="3" fill="hold">
-                      <p:stCondLst>
-                        <p:cond delay="indefinite"/>
-                      </p:stCondLst>
-                      <p:childTnLst>
-                        <p:par>
-                          <p:cTn id="4" fill="hold">
-                            <p:stCondLst>
-                              <p:cond delay="0"/>
-                            </p:stCondLst>
-                            <p:childTnLst>
-                              <p:par>
-                                <p:cTn id="5" presetID="1" presetClass="entr" presetSubtype="0" fill="hold" nodeType="clickEffect">
-                                  <p:stCondLst>
-                                    <p:cond delay="0"/>
-                                  </p:stCondLst>
-                                  <p:childTnLst>
-                                    <p:set>
-                                      <p:cBhvr>
-                                        <p:cTn id="6" dur="1" fill="hold">
-                                          <p:stCondLst>
-                                            <p:cond delay="0"/>
-                                          </p:stCondLst>
-                                        </p:cTn>
-                                        <p:tgtEl>
-                                          <p:spTgt spid="2">
-                                            <p:txEl>
-                                              <p:pRg st="0" end="0"/>
-                                            </p:txEl>
-                                          </p:spTgt>
-                                        </p:tgtEl>
-                                        <p:attrNameLst>
-                                          <p:attrName>style.visibility</p:attrName>
-                                        </p:attrNameLst>
-                                      </p:cBhvr>
-                                      <p:to>
-                                        <p:strVal val="visible"/>
-                                      </p:to>
-                                    </p:set>
-                                  </p:childTnLst>
-                                </p:cTn>
-                              </p:par>
-                            </p:childTnLst>
-                          </p:cTn>
-                        </p:par>
-                      </p:childTnLst>
-                    </p:cTn>
-                  </p:par>
-                  <p:par>
-                    <p:cTn id="7" fill="hold">
-                      <p:stCondLst>
-                        <p:cond delay="indefinite"/>
-                      </p:stCondLst>
-                      <p:childTnLst>
-                        <p:par>
-                          <p:cTn id="8" fill="hold">
-                            <p:stCondLst>
-                              <p:cond delay="0"/>
-                            </p:stCondLst>
-                            <p:childTnLst>
-                              <p:par>
-                                <p:cTn id="9" presetID="1" presetClass="entr" presetSubtype="0" fill="hold" nodeType="clickEffect">
-                                  <p:stCondLst>
-                                    <p:cond delay="0"/>
-                                  </p:stCondLst>
-                                  <p:childTnLst>
-                                    <p:set>
-                                      <p:cBhvr>
-                                        <p:cTn id="10" dur="1" fill="hold">
-                                          <p:stCondLst>
-                                            <p:cond delay="0"/>
-                                          </p:stCondLst>
-                                        </p:cTn>
-                                        <p:tgtEl>
-                                          <p:spTgt spid="2">
-                                            <p:txEl>
-                                              <p:pRg st="1" end="1"/>
-                                            </p:txEl>
-                                          </p:spTgt>
-                                        </p:tgtEl>
-                                        <p:attrNameLst>
-                                          <p:attrName>style.visibility</p:attrName>
-                                        </p:attrNameLst>
-                                      </p:cBhvr>
-                                      <p:to>
-                                        <p:strVal val="visible"/>
-                                      </p:to>
-                                    </p:set>
-                                  </p:childTnLst>
-                                </p:cTn>
-                              </p:par>
-                            </p:childTnLst>
-                          </p:cTn>
-                        </p:par>
-                      </p:childTnLst>
-                    </p:cTn>
-                  </p:par>
-                  <p:par>
-                    <p:cTn id="11" fill="hold">
-                      <p:stCondLst>
-                        <p:cond delay="indefinite"/>
-                      </p:stCondLst>
-                      <p:childTnLst>
-                        <p:par>
-                          <p:cTn id="12" fill="hold">
-                            <p:stCondLst>
-                              <p:cond delay="0"/>
-                            </p:stCondLst>
-                            <p:childTnLst>
-                              <p:par>
-                                <p:cTn id="13" presetID="1" presetClass="entr" presetSubtype="0" fill="hold" nodeType="clickEffect">
-                                  <p:stCondLst>
-                                    <p:cond delay="0"/>
-                                  </p:stCondLst>
-                                  <p:childTnLst>
-                                    <p:set>
-                                      <p:cBhvr>
-                                        <p:cTn id="14" dur="1" fill="hold">
-                                          <p:stCondLst>
-                                            <p:cond delay="0"/>
-                                          </p:stCondLst>
-                                        </p:cTn>
-                                        <p:tgtEl>
-                                          <p:spTgt spid="2">
-                                            <p:txEl>
-                                              <p:pRg st="2" end="2"/>
-                                            </p:txEl>
-                                          </p:spTgt>
-                                        </p:tgtEl>
-                                        <p:attrNameLst>
-                                          <p:attrName>style.visibility</p:attrName>
-                                        </p:attrNameLst>
-                                      </p:cBhvr>
-                                      <p:to>
-                                        <p:strVal val="visible"/>
-                                      </p:to>
-                                    </p:set>
-                                  </p:childTnLst>
-                                </p:cTn>
-                              </p:par>
-                            </p:childTnLst>
-                          </p:cTn>
-                        </p:par>
-                      </p:childTnLst>
-                    </p:cTn>
-                  </p:par>
-                </p:childTnLst>
-              </p:cTn>
-              <p:prevCondLst>
-                <p:cond evt="onPrev" delay="0">
-                  <p:tgtEl>
-                    <p:sldTgt/>
-                  </p:tgtEl>
-                </p:cond>
-              </p:prevCondLst>
-              <p:nextCondLst>
-                <p:cond evt="onNext" delay="0">
-                  <p:tgtEl>
-                    <p:sldTgt/>
-                  </p:tgtEl>
-                </p:cond>
-              </p:nextCondLst>
-            </p:seq>
-          </p:childTnLst>
-        </p:cTn>
-      </p:par>
-    </p:tnLst>
-  </p:timing>
 </p:sld>
 </file>
 
@@ -11757,13 +11536,6 @@
   <p:clrMapOvr>
     <a:masterClrMapping/>
   </p:clrMapOvr>
-  <p:timing>
-    <p:tnLst>
-      <p:par>
-        <p:cTn id="1" dur="indefinite" restart="never" nodeType="tmRoot"/>
-      </p:par>
-    </p:tnLst>
-  </p:timing>
 </p:sld>
 </file>
 
@@ -12212,36 +11984,41 @@
           <a:lstStyle/>
           <a:p>
             <a:r>
-              <a:rPr lang="de-CH" dirty="0"/>
-              <a:t>Medicament.java</a:t>
-            </a:r>
-          </a:p>
-          <a:p>
-            <a:r>
-              <a:rPr lang="de-CH" dirty="0"/>
-              <a:t>Person.java</a:t>
-            </a:r>
+              <a:rPr lang="de-CH" dirty="0" err="1" smtClean="0"/>
+              <a:t>Medicament</a:t>
+            </a:r>
+            <a:endParaRPr lang="de-CH" dirty="0" smtClean="0"/>
+          </a:p>
+          <a:p>
+            <a:r>
+              <a:rPr lang="de-CH" dirty="0" smtClean="0"/>
+              <a:t>Person</a:t>
+            </a:r>
+            <a:endParaRPr lang="de-CH" dirty="0"/>
           </a:p>
           <a:p>
             <a:pPr lvl="1"/>
             <a:r>
-              <a:rPr lang="de-CH" dirty="0"/>
-              <a:t>Patient.java</a:t>
-            </a:r>
+              <a:rPr lang="de-CH" dirty="0" smtClean="0"/>
+              <a:t>Patient</a:t>
+            </a:r>
+            <a:endParaRPr lang="de-CH" dirty="0"/>
           </a:p>
           <a:p>
             <a:pPr lvl="1"/>
             <a:r>
-              <a:rPr lang="de-CH" dirty="0"/>
-              <a:t>FamilyMember.java</a:t>
-            </a:r>
+              <a:rPr lang="de-CH" dirty="0" err="1" smtClean="0"/>
+              <a:t>FamilyMember</a:t>
+            </a:r>
+            <a:endParaRPr lang="de-CH" dirty="0"/>
           </a:p>
           <a:p>
             <a:pPr lvl="1"/>
             <a:r>
-              <a:rPr lang="de-CH" dirty="0"/>
-              <a:t>Doctor.java</a:t>
-            </a:r>
+              <a:rPr lang="de-CH" dirty="0" err="1" smtClean="0"/>
+              <a:t>Doctor</a:t>
+            </a:r>
+            <a:endParaRPr lang="de-CH" dirty="0"/>
           </a:p>
           <a:p>
             <a:r>
@@ -13795,23 +13572,6 @@
 </file>
 
 <file path=customXml/item1.xml><?xml version="1.0" encoding="utf-8"?>
-<p:properties xmlns:p="http://schemas.microsoft.com/office/2006/metadata/properties" xmlns:xsi="http://www.w3.org/2001/XMLSchema-instance">
-  <documentManagement>
-    <AVMTitle xmlns="5091c847-84be-4f4f-b16c-c018ad2ca66b">Präsentation BFH_2013</AVMTitle>
-  </documentManagement>
-</p:properties>
-</file>
-
-<file path=customXml/item2.xml><?xml version="1.0" encoding="utf-8"?>
-<?mso-contentType ?>
-<FormTemplates xmlns="http://schemas.microsoft.com/sharepoint/v3/contenttype/forms">
-  <Display>DocumentLibraryForm</Display>
-  <Edit>DocumentLibraryForm</Edit>
-  <New>DocumentLibraryForm</New>
-</FormTemplates>
-</file>
-
-<file path=customXml/item3.xml><?xml version="1.0" encoding="utf-8"?>
 <ct:contentTypeSchema xmlns:ct="http://schemas.microsoft.com/office/2006/metadata/contentType" xmlns:ma="http://schemas.microsoft.com/office/2006/metadata/properties/metaAttributes" ct:_="" ma:_="" ma:contentTypeName="Dokument" ma:contentTypeID="0x010100EBE3A9EFF36793468C03E2811ACE2A2B" ma:contentTypeVersion="1" ma:contentTypeDescription="Ein neues Dokument erstellen." ma:contentTypeScope="" ma:versionID="e65be32cb1bfff77fc8c9c09bf542651">
   <xsd:schema xmlns:xsd="http://www.w3.org/2001/XMLSchema" xmlns:p="http://schemas.microsoft.com/office/2006/metadata/properties" xmlns:ns2="5091c847-84be-4f4f-b16c-c018ad2ca66b" targetNamespace="http://schemas.microsoft.com/office/2006/metadata/properties" ma:root="true" ma:fieldsID="7636c84aed5b7d09a166fcef888725d4" ns2:_="">
     <xsd:import namespace="5091c847-84be-4f4f-b16c-c018ad2ca66b"/>
@@ -13871,30 +13631,24 @@
 </ct:contentTypeSchema>
 </file>
 
-<file path=customXml/itemProps1.xml><?xml version="1.0" encoding="utf-8"?>
-<ds:datastoreItem xmlns:ds="http://schemas.openxmlformats.org/officeDocument/2006/customXml" ds:itemID="{32991507-CB83-4F49-BAFB-D322B1D04098}">
-  <ds:schemaRefs>
-    <ds:schemaRef ds:uri="http://purl.org/dc/terms/"/>
-    <ds:schemaRef ds:uri="http://purl.org/dc/elements/1.1/"/>
-    <ds:schemaRef ds:uri="http://www.w3.org/XML/1998/namespace"/>
-    <ds:schemaRef ds:uri="http://schemas.microsoft.com/office/2006/documentManagement/types"/>
-    <ds:schemaRef ds:uri="http://schemas.openxmlformats.org/package/2006/metadata/core-properties"/>
-    <ds:schemaRef ds:uri="5091c847-84be-4f4f-b16c-c018ad2ca66b"/>
-    <ds:schemaRef ds:uri="http://schemas.microsoft.com/office/2006/metadata/properties"/>
-    <ds:schemaRef ds:uri="http://purl.org/dc/dcmitype/"/>
-  </ds:schemaRefs>
-</ds:datastoreItem>
+<file path=customXml/item2.xml><?xml version="1.0" encoding="utf-8"?>
+<?mso-contentType ?>
+<FormTemplates xmlns="http://schemas.microsoft.com/sharepoint/v3/contenttype/forms">
+  <Display>DocumentLibraryForm</Display>
+  <Edit>DocumentLibraryForm</Edit>
+  <New>DocumentLibraryForm</New>
+</FormTemplates>
 </file>
 
-<file path=customXml/itemProps2.xml><?xml version="1.0" encoding="utf-8"?>
-<ds:datastoreItem xmlns:ds="http://schemas.openxmlformats.org/officeDocument/2006/customXml" ds:itemID="{1851D33F-E468-417B-A30C-509B68D2BD09}">
-  <ds:schemaRefs>
-    <ds:schemaRef ds:uri="http://schemas.microsoft.com/sharepoint/v3/contenttype/forms"/>
-  </ds:schemaRefs>
-</ds:datastoreItem>
+<file path=customXml/item3.xml><?xml version="1.0" encoding="utf-8"?>
+<p:properties xmlns:p="http://schemas.microsoft.com/office/2006/metadata/properties" xmlns:xsi="http://www.w3.org/2001/XMLSchema-instance">
+  <documentManagement>
+    <AVMTitle xmlns="5091c847-84be-4f4f-b16c-c018ad2ca66b">Präsentation BFH_2013</AVMTitle>
+  </documentManagement>
+</p:properties>
 </file>
 
-<file path=customXml/itemProps3.xml><?xml version="1.0" encoding="utf-8"?>
+<file path=customXml/itemProps1.xml><?xml version="1.0" encoding="utf-8"?>
 <ds:datastoreItem xmlns:ds="http://schemas.openxmlformats.org/officeDocument/2006/customXml" ds:itemID="{15287BEA-F3FF-4B87-929B-5D0092183197}">
   <ds:schemaRefs>
     <ds:schemaRef ds:uri="http://schemas.microsoft.com/office/2006/metadata/contentType"/>
@@ -13909,4 +13663,27 @@
     <ds:schemaRef ds:uri="http://schemas.microsoft.com/office/internal/2005/internalDocumentation"/>
   </ds:schemaRefs>
 </ds:datastoreItem>
+</file>
+
+<file path=customXml/itemProps2.xml><?xml version="1.0" encoding="utf-8"?>
+<ds:datastoreItem xmlns:ds="http://schemas.openxmlformats.org/officeDocument/2006/customXml" ds:itemID="{1851D33F-E468-417B-A30C-509B68D2BD09}">
+  <ds:schemaRefs>
+    <ds:schemaRef ds:uri="http://schemas.microsoft.com/sharepoint/v3/contenttype/forms"/>
+  </ds:schemaRefs>
+</ds:datastoreItem>
+</file>
+
+<file path=customXml/itemProps3.xml><?xml version="1.0" encoding="utf-8"?>
+<ds:datastoreItem xmlns:ds="http://schemas.openxmlformats.org/officeDocument/2006/customXml" ds:itemID="{32991507-CB83-4F49-BAFB-D322B1D04098}">
+  <ds:schemaRefs>
+    <ds:schemaRef ds:uri="http://purl.org/dc/terms/"/>
+    <ds:schemaRef ds:uri="http://purl.org/dc/elements/1.1/"/>
+    <ds:schemaRef ds:uri="http://www.w3.org/XML/1998/namespace"/>
+    <ds:schemaRef ds:uri="http://schemas.microsoft.com/office/2006/documentManagement/types"/>
+    <ds:schemaRef ds:uri="http://schemas.openxmlformats.org/package/2006/metadata/core-properties"/>
+    <ds:schemaRef ds:uri="5091c847-84be-4f4f-b16c-c018ad2ca66b"/>
+    <ds:schemaRef ds:uri="http://schemas.microsoft.com/office/2006/metadata/properties"/>
+    <ds:schemaRef ds:uri="http://purl.org/dc/dcmitype/"/>
+  </ds:schemaRefs>
+</ds:datastoreItem>
 </file>
</xml_diff>